<commit_message>
Só envia, tá pronto
</commit_message>
<xml_diff>
--- a/Ações Beneficentes de Empresas.pptx
+++ b/Ações Beneficentes de Empresas.pptx
@@ -113,6 +113,11 @@
       </a:defRPr>
     </a:lvl9pPr>
   </p:defaultTextStyle>
+  <p:extLst>
+    <p:ext uri="{EFAFB233-063F-42B5-8137-9DF3F51BA10A}">
+      <p15:sldGuideLst xmlns:p15="http://schemas.microsoft.com/office/powerpoint/2012/main"/>
+    </p:ext>
+  </p:extLst>
 </p:presentation>
 </file>
 
@@ -158,7 +163,7 @@
           </a:lstStyle>
           <a:p>
             <a:r>
-              <a:rPr lang="pt-BR" smtClean="0"/>
+              <a:rPr lang="pt-BR"/>
               <a:t>Clique para editar o título mestre</a:t>
             </a:r>
             <a:endParaRPr lang="en-US" dirty="0"/>
@@ -278,7 +283,7 @@
           </a:lstStyle>
           <a:p>
             <a:r>
-              <a:rPr lang="pt-BR" smtClean="0"/>
+              <a:rPr lang="pt-BR"/>
               <a:t>Clique para editar o estilo do subtítulo mestre</a:t>
             </a:r>
             <a:endParaRPr lang="en-US" dirty="0"/>
@@ -302,7 +307,7 @@
           <a:p>
             <a:fld id="{599BDDEA-2A2D-4B9B-9399-F97012B02BDC}" type="datetimeFigureOut">
               <a:rPr lang="pt-BR" smtClean="0"/>
-              <a:t>11/03/2020</a:t>
+              <a:t>12/03/2020</a:t>
             </a:fld>
             <a:endParaRPr lang="pt-BR"/>
           </a:p>
@@ -407,7 +412,7 @@
           </a:lstStyle>
           <a:p>
             <a:r>
-              <a:rPr lang="pt-BR" smtClean="0"/>
+              <a:rPr lang="pt-BR"/>
               <a:t>Clique para editar o título mestre</a:t>
             </a:r>
             <a:endParaRPr lang="en-US" dirty="0"/>
@@ -486,7 +491,7 @@
           </a:lstStyle>
           <a:p>
             <a:r>
-              <a:rPr lang="pt-BR" smtClean="0"/>
+              <a:rPr lang="pt-BR"/>
               <a:t>Clique no ícone para adicionar uma imagem</a:t>
             </a:r>
             <a:endParaRPr lang="en-US" dirty="0"/>
@@ -554,7 +559,7 @@
           <a:p>
             <a:pPr lvl="0"/>
             <a:r>
-              <a:rPr lang="pt-BR" smtClean="0"/>
+              <a:rPr lang="pt-BR"/>
               <a:t>Clique para editar o texto mestre</a:t>
             </a:r>
           </a:p>
@@ -577,7 +582,7 @@
           <a:p>
             <a:fld id="{599BDDEA-2A2D-4B9B-9399-F97012B02BDC}" type="datetimeFigureOut">
               <a:rPr lang="pt-BR" smtClean="0"/>
-              <a:t>11/03/2020</a:t>
+              <a:t>12/03/2020</a:t>
             </a:fld>
             <a:endParaRPr lang="pt-BR"/>
           </a:p>
@@ -680,7 +685,7 @@
           </a:lstStyle>
           <a:p>
             <a:r>
-              <a:rPr lang="pt-BR" smtClean="0"/>
+              <a:rPr lang="pt-BR"/>
               <a:t>Clique para editar o título mestre</a:t>
             </a:r>
             <a:endParaRPr lang="en-US" dirty="0"/>
@@ -748,7 +753,7 @@
           <a:p>
             <a:pPr lvl="0"/>
             <a:r>
-              <a:rPr lang="pt-BR" smtClean="0"/>
+              <a:rPr lang="pt-BR"/>
               <a:t>Clique para editar o texto mestre</a:t>
             </a:r>
           </a:p>
@@ -771,7 +776,7 @@
           <a:p>
             <a:fld id="{599BDDEA-2A2D-4B9B-9399-F97012B02BDC}" type="datetimeFigureOut">
               <a:rPr lang="pt-BR" smtClean="0"/>
-              <a:t>11/03/2020</a:t>
+              <a:t>12/03/2020</a:t>
             </a:fld>
             <a:endParaRPr lang="pt-BR"/>
           </a:p>
@@ -874,7 +879,7 @@
           </a:lstStyle>
           <a:p>
             <a:r>
-              <a:rPr lang="pt-BR" smtClean="0"/>
+              <a:rPr lang="pt-BR"/>
               <a:t>Clique para editar o título mestre</a:t>
             </a:r>
             <a:endParaRPr lang="en-US" dirty="0"/>
@@ -952,7 +957,7 @@
           <a:p>
             <a:pPr lvl="0"/>
             <a:r>
-              <a:rPr lang="pt-BR" smtClean="0"/>
+              <a:rPr lang="pt-BR"/>
               <a:t>Clique para editar o texto mestre</a:t>
             </a:r>
           </a:p>
@@ -1019,7 +1024,7 @@
           <a:p>
             <a:pPr lvl="0"/>
             <a:r>
-              <a:rPr lang="pt-BR" smtClean="0"/>
+              <a:rPr lang="pt-BR"/>
               <a:t>Clique para editar o texto mestre</a:t>
             </a:r>
           </a:p>
@@ -1042,7 +1047,7 @@
           <a:p>
             <a:fld id="{599BDDEA-2A2D-4B9B-9399-F97012B02BDC}" type="datetimeFigureOut">
               <a:rPr lang="pt-BR" smtClean="0"/>
-              <a:t>11/03/2020</a:t>
+              <a:t>12/03/2020</a:t>
             </a:fld>
             <a:endParaRPr lang="pt-BR"/>
           </a:p>
@@ -1225,7 +1230,7 @@
           </a:lstStyle>
           <a:p>
             <a:r>
-              <a:rPr lang="pt-BR" smtClean="0"/>
+              <a:rPr lang="pt-BR"/>
               <a:t>Clique para editar o título mestre</a:t>
             </a:r>
             <a:endParaRPr lang="en-US" dirty="0"/>
@@ -1346,7 +1351,7 @@
           <a:p>
             <a:pPr lvl="0"/>
             <a:r>
-              <a:rPr lang="pt-BR" smtClean="0"/>
+              <a:rPr lang="pt-BR"/>
               <a:t>Clique para editar o texto mestre</a:t>
             </a:r>
           </a:p>
@@ -1369,7 +1374,7 @@
           <a:p>
             <a:fld id="{599BDDEA-2A2D-4B9B-9399-F97012B02BDC}" type="datetimeFigureOut">
               <a:rPr lang="pt-BR" smtClean="0"/>
-              <a:t>11/03/2020</a:t>
+              <a:t>12/03/2020</a:t>
             </a:fld>
             <a:endParaRPr lang="pt-BR"/>
           </a:p>
@@ -1467,7 +1472,7 @@
           </a:lstStyle>
           <a:p>
             <a:r>
-              <a:rPr lang="pt-BR" smtClean="0"/>
+              <a:rPr lang="pt-BR"/>
               <a:t>Clique para editar o título mestre</a:t>
             </a:r>
             <a:endParaRPr lang="en-US" dirty="0"/>
@@ -1542,7 +1547,7 @@
           <a:p>
             <a:pPr lvl="0"/>
             <a:r>
-              <a:rPr lang="pt-BR" smtClean="0"/>
+              <a:rPr lang="pt-BR"/>
               <a:t>Clique para editar o texto mestre</a:t>
             </a:r>
           </a:p>
@@ -1609,7 +1614,7 @@
           <a:p>
             <a:pPr lvl="0"/>
             <a:r>
-              <a:rPr lang="pt-BR" smtClean="0"/>
+              <a:rPr lang="pt-BR"/>
               <a:t>Clique para editar o texto mestre</a:t>
             </a:r>
           </a:p>
@@ -1683,7 +1688,7 @@
           <a:p>
             <a:pPr lvl="0"/>
             <a:r>
-              <a:rPr lang="pt-BR" smtClean="0"/>
+              <a:rPr lang="pt-BR"/>
               <a:t>Clique para editar o texto mestre</a:t>
             </a:r>
           </a:p>
@@ -1750,7 +1755,7 @@
           <a:p>
             <a:pPr lvl="0"/>
             <a:r>
-              <a:rPr lang="pt-BR" smtClean="0"/>
+              <a:rPr lang="pt-BR"/>
               <a:t>Clique para editar o texto mestre</a:t>
             </a:r>
           </a:p>
@@ -1824,7 +1829,7 @@
           <a:p>
             <a:pPr lvl="0"/>
             <a:r>
-              <a:rPr lang="pt-BR" smtClean="0"/>
+              <a:rPr lang="pt-BR"/>
               <a:t>Clique para editar o texto mestre</a:t>
             </a:r>
           </a:p>
@@ -1891,7 +1896,7 @@
           <a:p>
             <a:pPr lvl="0"/>
             <a:r>
-              <a:rPr lang="pt-BR" smtClean="0"/>
+              <a:rPr lang="pt-BR"/>
               <a:t>Clique para editar o texto mestre</a:t>
             </a:r>
           </a:p>
@@ -1988,7 +1993,7 @@
           <a:p>
             <a:fld id="{599BDDEA-2A2D-4B9B-9399-F97012B02BDC}" type="datetimeFigureOut">
               <a:rPr lang="pt-BR" smtClean="0"/>
-              <a:t>11/03/2020</a:t>
+              <a:t>12/03/2020</a:t>
             </a:fld>
             <a:endParaRPr lang="pt-BR"/>
           </a:p>
@@ -2086,7 +2091,7 @@
           </a:lstStyle>
           <a:p>
             <a:r>
-              <a:rPr lang="pt-BR" smtClean="0"/>
+              <a:rPr lang="pt-BR"/>
               <a:t>Clique para editar o título mestre</a:t>
             </a:r>
             <a:endParaRPr lang="en-US" dirty="0"/>
@@ -2158,7 +2163,7 @@
           <a:p>
             <a:pPr lvl="0"/>
             <a:r>
-              <a:rPr lang="pt-BR" smtClean="0"/>
+              <a:rPr lang="pt-BR"/>
               <a:t>Clique para editar o texto mestre</a:t>
             </a:r>
           </a:p>
@@ -2236,7 +2241,7 @@
           </a:lstStyle>
           <a:p>
             <a:r>
-              <a:rPr lang="pt-BR" smtClean="0"/>
+              <a:rPr lang="pt-BR"/>
               <a:t>Clique no ícone para adicionar uma imagem</a:t>
             </a:r>
             <a:endParaRPr lang="en-US" dirty="0"/>
@@ -2304,7 +2309,7 @@
           <a:p>
             <a:pPr lvl="0"/>
             <a:r>
-              <a:rPr lang="pt-BR" smtClean="0"/>
+              <a:rPr lang="pt-BR"/>
               <a:t>Clique para editar o texto mestre</a:t>
             </a:r>
           </a:p>
@@ -2375,7 +2380,7 @@
           <a:p>
             <a:pPr lvl="0"/>
             <a:r>
-              <a:rPr lang="pt-BR" smtClean="0"/>
+              <a:rPr lang="pt-BR"/>
               <a:t>Clique para editar o texto mestre</a:t>
             </a:r>
           </a:p>
@@ -2453,7 +2458,7 @@
           </a:lstStyle>
           <a:p>
             <a:r>
-              <a:rPr lang="pt-BR" smtClean="0"/>
+              <a:rPr lang="pt-BR"/>
               <a:t>Clique no ícone para adicionar uma imagem</a:t>
             </a:r>
             <a:endParaRPr lang="en-US" dirty="0"/>
@@ -2521,7 +2526,7 @@
           <a:p>
             <a:pPr lvl="0"/>
             <a:r>
-              <a:rPr lang="pt-BR" smtClean="0"/>
+              <a:rPr lang="pt-BR"/>
               <a:t>Clique para editar o texto mestre</a:t>
             </a:r>
           </a:p>
@@ -2592,7 +2597,7 @@
           <a:p>
             <a:pPr lvl="0"/>
             <a:r>
-              <a:rPr lang="pt-BR" smtClean="0"/>
+              <a:rPr lang="pt-BR"/>
               <a:t>Clique para editar o texto mestre</a:t>
             </a:r>
           </a:p>
@@ -2670,7 +2675,7 @@
           </a:lstStyle>
           <a:p>
             <a:r>
-              <a:rPr lang="pt-BR" smtClean="0"/>
+              <a:rPr lang="pt-BR"/>
               <a:t>Clique no ícone para adicionar uma imagem</a:t>
             </a:r>
             <a:endParaRPr lang="en-US" dirty="0"/>
@@ -2738,7 +2743,7 @@
           <a:p>
             <a:pPr lvl="0"/>
             <a:r>
-              <a:rPr lang="pt-BR" smtClean="0"/>
+              <a:rPr lang="pt-BR"/>
               <a:t>Clique para editar o texto mestre</a:t>
             </a:r>
           </a:p>
@@ -2835,7 +2840,7 @@
           <a:p>
             <a:fld id="{599BDDEA-2A2D-4B9B-9399-F97012B02BDC}" type="datetimeFigureOut">
               <a:rPr lang="pt-BR" smtClean="0"/>
-              <a:t>11/03/2020</a:t>
+              <a:t>12/03/2020</a:t>
             </a:fld>
             <a:endParaRPr lang="pt-BR"/>
           </a:p>
@@ -2929,7 +2934,7 @@
           <a:lstStyle/>
           <a:p>
             <a:r>
-              <a:rPr lang="pt-BR" smtClean="0"/>
+              <a:rPr lang="pt-BR"/>
               <a:t>Clique para editar o título mestre</a:t>
             </a:r>
             <a:endParaRPr lang="en-US" dirty="0"/>
@@ -2953,35 +2958,35 @@
           <a:p>
             <a:pPr lvl="0"/>
             <a:r>
-              <a:rPr lang="pt-BR" smtClean="0"/>
+              <a:rPr lang="pt-BR"/>
               <a:t>Clique para editar o texto mestre</a:t>
             </a:r>
           </a:p>
           <a:p>
             <a:pPr lvl="1"/>
             <a:r>
-              <a:rPr lang="pt-BR" smtClean="0"/>
+              <a:rPr lang="pt-BR"/>
               <a:t>Segundo nível</a:t>
             </a:r>
           </a:p>
           <a:p>
             <a:pPr lvl="2"/>
             <a:r>
-              <a:rPr lang="pt-BR" smtClean="0"/>
+              <a:rPr lang="pt-BR"/>
               <a:t>Terceiro nível</a:t>
             </a:r>
           </a:p>
           <a:p>
             <a:pPr lvl="3"/>
             <a:r>
-              <a:rPr lang="pt-BR" smtClean="0"/>
+              <a:rPr lang="pt-BR"/>
               <a:t>Quarto nível</a:t>
             </a:r>
           </a:p>
           <a:p>
             <a:pPr lvl="4"/>
             <a:r>
-              <a:rPr lang="pt-BR" smtClean="0"/>
+              <a:rPr lang="pt-BR"/>
               <a:t>Quinto nível</a:t>
             </a:r>
             <a:endParaRPr lang="en-US" dirty="0"/>
@@ -3005,7 +3010,7 @@
           <a:p>
             <a:fld id="{599BDDEA-2A2D-4B9B-9399-F97012B02BDC}" type="datetimeFigureOut">
               <a:rPr lang="pt-BR" smtClean="0"/>
-              <a:t>11/03/2020</a:t>
+              <a:t>12/03/2020</a:t>
             </a:fld>
             <a:endParaRPr lang="pt-BR"/>
           </a:p>
@@ -3104,7 +3109,7 @@
           <a:lstStyle/>
           <a:p>
             <a:r>
-              <a:rPr lang="pt-BR" smtClean="0"/>
+              <a:rPr lang="pt-BR"/>
               <a:t>Clique para editar o título mestre</a:t>
             </a:r>
             <a:endParaRPr lang="en-US" dirty="0"/>
@@ -3133,35 +3138,35 @@
           <a:p>
             <a:pPr lvl="0"/>
             <a:r>
-              <a:rPr lang="pt-BR" smtClean="0"/>
+              <a:rPr lang="pt-BR"/>
               <a:t>Clique para editar o texto mestre</a:t>
             </a:r>
           </a:p>
           <a:p>
             <a:pPr lvl="1"/>
             <a:r>
-              <a:rPr lang="pt-BR" smtClean="0"/>
+              <a:rPr lang="pt-BR"/>
               <a:t>Segundo nível</a:t>
             </a:r>
           </a:p>
           <a:p>
             <a:pPr lvl="2"/>
             <a:r>
-              <a:rPr lang="pt-BR" smtClean="0"/>
+              <a:rPr lang="pt-BR"/>
               <a:t>Terceiro nível</a:t>
             </a:r>
           </a:p>
           <a:p>
             <a:pPr lvl="3"/>
             <a:r>
-              <a:rPr lang="pt-BR" smtClean="0"/>
+              <a:rPr lang="pt-BR"/>
               <a:t>Quarto nível</a:t>
             </a:r>
           </a:p>
           <a:p>
             <a:pPr lvl="4"/>
             <a:r>
-              <a:rPr lang="pt-BR" smtClean="0"/>
+              <a:rPr lang="pt-BR"/>
               <a:t>Quinto nível</a:t>
             </a:r>
             <a:endParaRPr lang="en-US" dirty="0"/>
@@ -3185,7 +3190,7 @@
           <a:p>
             <a:fld id="{599BDDEA-2A2D-4B9B-9399-F97012B02BDC}" type="datetimeFigureOut">
               <a:rPr lang="pt-BR" smtClean="0"/>
-              <a:t>11/03/2020</a:t>
+              <a:t>12/03/2020</a:t>
             </a:fld>
             <a:endParaRPr lang="pt-BR"/>
           </a:p>
@@ -3288,7 +3293,7 @@
           </a:lstStyle>
           <a:p>
             <a:r>
-              <a:rPr lang="pt-BR" smtClean="0"/>
+              <a:rPr lang="pt-BR"/>
               <a:t>Clique para editar o título mestre</a:t>
             </a:r>
             <a:endParaRPr lang="en-US" dirty="0"/>
@@ -3405,7 +3410,7 @@
           </a:lstStyle>
           <a:p>
             <a:r>
-              <a:rPr lang="pt-BR" smtClean="0"/>
+              <a:rPr lang="pt-BR"/>
               <a:t>Clique para editar o estilo do subtítulo mestre</a:t>
             </a:r>
             <a:endParaRPr lang="en-US" dirty="0"/>
@@ -3429,7 +3434,7 @@
           <a:p>
             <a:fld id="{599BDDEA-2A2D-4B9B-9399-F97012B02BDC}" type="datetimeFigureOut">
               <a:rPr lang="pt-BR" smtClean="0"/>
-              <a:t>11/03/2020</a:t>
+              <a:t>12/03/2020</a:t>
             </a:fld>
             <a:endParaRPr lang="pt-BR"/>
           </a:p>
@@ -3523,7 +3528,7 @@
           <a:lstStyle/>
           <a:p>
             <a:r>
-              <a:rPr lang="pt-BR" smtClean="0"/>
+              <a:rPr lang="pt-BR"/>
               <a:t>Clique para editar o título mestre</a:t>
             </a:r>
             <a:endParaRPr lang="en-US" dirty="0"/>
@@ -3547,35 +3552,35 @@
           <a:p>
             <a:pPr lvl="0"/>
             <a:r>
-              <a:rPr lang="pt-BR" smtClean="0"/>
+              <a:rPr lang="pt-BR"/>
               <a:t>Clique para editar o texto mestre</a:t>
             </a:r>
           </a:p>
           <a:p>
             <a:pPr lvl="1"/>
             <a:r>
-              <a:rPr lang="pt-BR" smtClean="0"/>
+              <a:rPr lang="pt-BR"/>
               <a:t>Segundo nível</a:t>
             </a:r>
           </a:p>
           <a:p>
             <a:pPr lvl="2"/>
             <a:r>
-              <a:rPr lang="pt-BR" smtClean="0"/>
+              <a:rPr lang="pt-BR"/>
               <a:t>Terceiro nível</a:t>
             </a:r>
           </a:p>
           <a:p>
             <a:pPr lvl="3"/>
             <a:r>
-              <a:rPr lang="pt-BR" smtClean="0"/>
+              <a:rPr lang="pt-BR"/>
               <a:t>Quarto nível</a:t>
             </a:r>
           </a:p>
           <a:p>
             <a:pPr lvl="4"/>
             <a:r>
-              <a:rPr lang="pt-BR" smtClean="0"/>
+              <a:rPr lang="pt-BR"/>
               <a:t>Quinto nível</a:t>
             </a:r>
             <a:endParaRPr lang="en-US" dirty="0"/>
@@ -3599,7 +3604,7 @@
           <a:p>
             <a:fld id="{599BDDEA-2A2D-4B9B-9399-F97012B02BDC}" type="datetimeFigureOut">
               <a:rPr lang="pt-BR" smtClean="0"/>
-              <a:t>11/03/2020</a:t>
+              <a:t>12/03/2020</a:t>
             </a:fld>
             <a:endParaRPr lang="pt-BR"/>
           </a:p>
@@ -3693,7 +3698,7 @@
           <a:lstStyle/>
           <a:p>
             <a:r>
-              <a:rPr lang="pt-BR" smtClean="0"/>
+              <a:rPr lang="pt-BR"/>
               <a:t>Clique para editar o título mestre</a:t>
             </a:r>
             <a:endParaRPr lang="en-US" dirty="0"/>
@@ -3717,35 +3722,35 @@
           <a:p>
             <a:pPr lvl="0"/>
             <a:r>
-              <a:rPr lang="pt-BR" smtClean="0"/>
+              <a:rPr lang="pt-BR"/>
               <a:t>Clique para editar o texto mestre</a:t>
             </a:r>
           </a:p>
           <a:p>
             <a:pPr lvl="1"/>
             <a:r>
-              <a:rPr lang="pt-BR" smtClean="0"/>
+              <a:rPr lang="pt-BR"/>
               <a:t>Segundo nível</a:t>
             </a:r>
           </a:p>
           <a:p>
             <a:pPr lvl="2"/>
             <a:r>
-              <a:rPr lang="pt-BR" smtClean="0"/>
+              <a:rPr lang="pt-BR"/>
               <a:t>Terceiro nível</a:t>
             </a:r>
           </a:p>
           <a:p>
             <a:pPr lvl="3"/>
             <a:r>
-              <a:rPr lang="pt-BR" smtClean="0"/>
+              <a:rPr lang="pt-BR"/>
               <a:t>Quarto nível</a:t>
             </a:r>
           </a:p>
           <a:p>
             <a:pPr lvl="4"/>
             <a:r>
-              <a:rPr lang="pt-BR" smtClean="0"/>
+              <a:rPr lang="pt-BR"/>
               <a:t>Quinto nível</a:t>
             </a:r>
             <a:endParaRPr lang="en-US" dirty="0"/>
@@ -3769,7 +3774,7 @@
           <a:p>
             <a:fld id="{599BDDEA-2A2D-4B9B-9399-F97012B02BDC}" type="datetimeFigureOut">
               <a:rPr lang="pt-BR" smtClean="0"/>
-              <a:t>11/03/2020</a:t>
+              <a:t>12/03/2020</a:t>
             </a:fld>
             <a:endParaRPr lang="pt-BR"/>
           </a:p>
@@ -3872,7 +3877,7 @@
           </a:lstStyle>
           <a:p>
             <a:r>
-              <a:rPr lang="pt-BR" smtClean="0"/>
+              <a:rPr lang="pt-BR"/>
               <a:t>Clique para editar o título mestre</a:t>
             </a:r>
             <a:endParaRPr lang="en-US" dirty="0"/>
@@ -3990,7 +3995,7 @@
           <a:p>
             <a:pPr lvl="0"/>
             <a:r>
-              <a:rPr lang="pt-BR" smtClean="0"/>
+              <a:rPr lang="pt-BR"/>
               <a:t>Clique para editar o texto mestre</a:t>
             </a:r>
           </a:p>
@@ -4013,7 +4018,7 @@
           <a:p>
             <a:fld id="{599BDDEA-2A2D-4B9B-9399-F97012B02BDC}" type="datetimeFigureOut">
               <a:rPr lang="pt-BR" smtClean="0"/>
-              <a:t>11/03/2020</a:t>
+              <a:t>12/03/2020</a:t>
             </a:fld>
             <a:endParaRPr lang="pt-BR"/>
           </a:p>
@@ -4107,7 +4112,7 @@
           <a:lstStyle/>
           <a:p>
             <a:r>
-              <a:rPr lang="pt-BR" smtClean="0"/>
+              <a:rPr lang="pt-BR"/>
               <a:t>Clique para editar o título mestre</a:t>
             </a:r>
             <a:endParaRPr lang="en-US" dirty="0"/>
@@ -4166,35 +4171,35 @@
           <a:p>
             <a:pPr lvl="0"/>
             <a:r>
-              <a:rPr lang="pt-BR" smtClean="0"/>
+              <a:rPr lang="pt-BR"/>
               <a:t>Clique para editar o texto mestre</a:t>
             </a:r>
           </a:p>
           <a:p>
             <a:pPr lvl="1"/>
             <a:r>
-              <a:rPr lang="pt-BR" smtClean="0"/>
+              <a:rPr lang="pt-BR"/>
               <a:t>Segundo nível</a:t>
             </a:r>
           </a:p>
           <a:p>
             <a:pPr lvl="2"/>
             <a:r>
-              <a:rPr lang="pt-BR" smtClean="0"/>
+              <a:rPr lang="pt-BR"/>
               <a:t>Terceiro nível</a:t>
             </a:r>
           </a:p>
           <a:p>
             <a:pPr lvl="3"/>
             <a:r>
-              <a:rPr lang="pt-BR" smtClean="0"/>
+              <a:rPr lang="pt-BR"/>
               <a:t>Quarto nível</a:t>
             </a:r>
           </a:p>
           <a:p>
             <a:pPr lvl="4"/>
             <a:r>
-              <a:rPr lang="pt-BR" smtClean="0"/>
+              <a:rPr lang="pt-BR"/>
               <a:t>Quinto nível</a:t>
             </a:r>
             <a:endParaRPr lang="en-US" dirty="0"/>
@@ -4253,35 +4258,35 @@
           <a:p>
             <a:pPr lvl="0"/>
             <a:r>
-              <a:rPr lang="pt-BR" smtClean="0"/>
+              <a:rPr lang="pt-BR"/>
               <a:t>Clique para editar o texto mestre</a:t>
             </a:r>
           </a:p>
           <a:p>
             <a:pPr lvl="1"/>
             <a:r>
-              <a:rPr lang="pt-BR" smtClean="0"/>
+              <a:rPr lang="pt-BR"/>
               <a:t>Segundo nível</a:t>
             </a:r>
           </a:p>
           <a:p>
             <a:pPr lvl="2"/>
             <a:r>
-              <a:rPr lang="pt-BR" smtClean="0"/>
+              <a:rPr lang="pt-BR"/>
               <a:t>Terceiro nível</a:t>
             </a:r>
           </a:p>
           <a:p>
             <a:pPr lvl="3"/>
             <a:r>
-              <a:rPr lang="pt-BR" smtClean="0"/>
+              <a:rPr lang="pt-BR"/>
               <a:t>Quarto nível</a:t>
             </a:r>
           </a:p>
           <a:p>
             <a:pPr lvl="4"/>
             <a:r>
-              <a:rPr lang="pt-BR" smtClean="0"/>
+              <a:rPr lang="pt-BR"/>
               <a:t>Quinto nível</a:t>
             </a:r>
             <a:endParaRPr lang="en-US" dirty="0"/>
@@ -4305,7 +4310,7 @@
           <a:p>
             <a:fld id="{599BDDEA-2A2D-4B9B-9399-F97012B02BDC}" type="datetimeFigureOut">
               <a:rPr lang="pt-BR" smtClean="0"/>
-              <a:t>11/03/2020</a:t>
+              <a:t>12/03/2020</a:t>
             </a:fld>
             <a:endParaRPr lang="pt-BR"/>
           </a:p>
@@ -4403,7 +4408,7 @@
           </a:lstStyle>
           <a:p>
             <a:r>
-              <a:rPr lang="pt-BR" smtClean="0"/>
+              <a:rPr lang="pt-BR"/>
               <a:t>Clique para editar o título mestre</a:t>
             </a:r>
             <a:endParaRPr lang="en-US" dirty="0"/>
@@ -4475,7 +4480,7 @@
           <a:p>
             <a:pPr lvl="0"/>
             <a:r>
-              <a:rPr lang="pt-BR" smtClean="0"/>
+              <a:rPr lang="pt-BR"/>
               <a:t>Clique para editar o texto mestre</a:t>
             </a:r>
           </a:p>
@@ -4533,35 +4538,35 @@
           <a:p>
             <a:pPr lvl="0"/>
             <a:r>
-              <a:rPr lang="pt-BR" smtClean="0"/>
+              <a:rPr lang="pt-BR"/>
               <a:t>Clique para editar o texto mestre</a:t>
             </a:r>
           </a:p>
           <a:p>
             <a:pPr lvl="1"/>
             <a:r>
-              <a:rPr lang="pt-BR" smtClean="0"/>
+              <a:rPr lang="pt-BR"/>
               <a:t>Segundo nível</a:t>
             </a:r>
           </a:p>
           <a:p>
             <a:pPr lvl="2"/>
             <a:r>
-              <a:rPr lang="pt-BR" smtClean="0"/>
+              <a:rPr lang="pt-BR"/>
               <a:t>Terceiro nível</a:t>
             </a:r>
           </a:p>
           <a:p>
             <a:pPr lvl="3"/>
             <a:r>
-              <a:rPr lang="pt-BR" smtClean="0"/>
+              <a:rPr lang="pt-BR"/>
               <a:t>Quarto nível</a:t>
             </a:r>
           </a:p>
           <a:p>
             <a:pPr lvl="4"/>
             <a:r>
-              <a:rPr lang="pt-BR" smtClean="0"/>
+              <a:rPr lang="pt-BR"/>
               <a:t>Quinto nível</a:t>
             </a:r>
             <a:endParaRPr lang="en-US" dirty="0"/>
@@ -4633,7 +4638,7 @@
           <a:p>
             <a:pPr lvl="0"/>
             <a:r>
-              <a:rPr lang="pt-BR" smtClean="0"/>
+              <a:rPr lang="pt-BR"/>
               <a:t>Clique para editar o texto mestre</a:t>
             </a:r>
           </a:p>
@@ -4691,35 +4696,35 @@
           <a:p>
             <a:pPr lvl="0"/>
             <a:r>
-              <a:rPr lang="pt-BR" smtClean="0"/>
+              <a:rPr lang="pt-BR"/>
               <a:t>Clique para editar o texto mestre</a:t>
             </a:r>
           </a:p>
           <a:p>
             <a:pPr lvl="1"/>
             <a:r>
-              <a:rPr lang="pt-BR" smtClean="0"/>
+              <a:rPr lang="pt-BR"/>
               <a:t>Segundo nível</a:t>
             </a:r>
           </a:p>
           <a:p>
             <a:pPr lvl="2"/>
             <a:r>
-              <a:rPr lang="pt-BR" smtClean="0"/>
+              <a:rPr lang="pt-BR"/>
               <a:t>Terceiro nível</a:t>
             </a:r>
           </a:p>
           <a:p>
             <a:pPr lvl="3"/>
             <a:r>
-              <a:rPr lang="pt-BR" smtClean="0"/>
+              <a:rPr lang="pt-BR"/>
               <a:t>Quarto nível</a:t>
             </a:r>
           </a:p>
           <a:p>
             <a:pPr lvl="4"/>
             <a:r>
-              <a:rPr lang="pt-BR" smtClean="0"/>
+              <a:rPr lang="pt-BR"/>
               <a:t>Quinto nível</a:t>
             </a:r>
             <a:endParaRPr lang="en-US" dirty="0"/>
@@ -4743,7 +4748,7 @@
           <a:p>
             <a:fld id="{599BDDEA-2A2D-4B9B-9399-F97012B02BDC}" type="datetimeFigureOut">
               <a:rPr lang="pt-BR" smtClean="0"/>
-              <a:t>11/03/2020</a:t>
+              <a:t>12/03/2020</a:t>
             </a:fld>
             <a:endParaRPr lang="pt-BR"/>
           </a:p>
@@ -4837,7 +4842,7 @@
           <a:lstStyle/>
           <a:p>
             <a:r>
-              <a:rPr lang="pt-BR" smtClean="0"/>
+              <a:rPr lang="pt-BR"/>
               <a:t>Clique para editar o título mestre</a:t>
             </a:r>
             <a:endParaRPr lang="en-US" dirty="0"/>
@@ -4861,7 +4866,7 @@
           <a:p>
             <a:fld id="{599BDDEA-2A2D-4B9B-9399-F97012B02BDC}" type="datetimeFigureOut">
               <a:rPr lang="pt-BR" smtClean="0"/>
-              <a:t>11/03/2020</a:t>
+              <a:t>12/03/2020</a:t>
             </a:fld>
             <a:endParaRPr lang="pt-BR"/>
           </a:p>
@@ -4956,7 +4961,7 @@
           <a:p>
             <a:fld id="{599BDDEA-2A2D-4B9B-9399-F97012B02BDC}" type="datetimeFigureOut">
               <a:rPr lang="pt-BR" smtClean="0"/>
-              <a:t>11/03/2020</a:t>
+              <a:t>12/03/2020</a:t>
             </a:fld>
             <a:endParaRPr lang="pt-BR"/>
           </a:p>
@@ -5059,7 +5064,7 @@
           </a:lstStyle>
           <a:p>
             <a:r>
-              <a:rPr lang="pt-BR" smtClean="0"/>
+              <a:rPr lang="pt-BR"/>
               <a:t>Clique para editar o título mestre</a:t>
             </a:r>
             <a:endParaRPr lang="en-US" dirty="0"/>
@@ -5118,35 +5123,35 @@
           <a:p>
             <a:pPr lvl="0"/>
             <a:r>
-              <a:rPr lang="pt-BR" smtClean="0"/>
+              <a:rPr lang="pt-BR"/>
               <a:t>Clique para editar o texto mestre</a:t>
             </a:r>
           </a:p>
           <a:p>
             <a:pPr lvl="1"/>
             <a:r>
-              <a:rPr lang="pt-BR" smtClean="0"/>
+              <a:rPr lang="pt-BR"/>
               <a:t>Segundo nível</a:t>
             </a:r>
           </a:p>
           <a:p>
             <a:pPr lvl="2"/>
             <a:r>
-              <a:rPr lang="pt-BR" smtClean="0"/>
+              <a:rPr lang="pt-BR"/>
               <a:t>Terceiro nível</a:t>
             </a:r>
           </a:p>
           <a:p>
             <a:pPr lvl="3"/>
             <a:r>
-              <a:rPr lang="pt-BR" smtClean="0"/>
+              <a:rPr lang="pt-BR"/>
               <a:t>Quarto nível</a:t>
             </a:r>
           </a:p>
           <a:p>
             <a:pPr lvl="4"/>
             <a:r>
-              <a:rPr lang="pt-BR" smtClean="0"/>
+              <a:rPr lang="pt-BR"/>
               <a:t>Quinto nível</a:t>
             </a:r>
             <a:endParaRPr lang="en-US" dirty="0"/>
@@ -5212,7 +5217,7 @@
           <a:p>
             <a:pPr lvl="0"/>
             <a:r>
-              <a:rPr lang="pt-BR" smtClean="0"/>
+              <a:rPr lang="pt-BR"/>
               <a:t>Clique para editar o texto mestre</a:t>
             </a:r>
           </a:p>
@@ -5235,7 +5240,7 @@
           <a:p>
             <a:fld id="{599BDDEA-2A2D-4B9B-9399-F97012B02BDC}" type="datetimeFigureOut">
               <a:rPr lang="pt-BR" smtClean="0"/>
-              <a:t>11/03/2020</a:t>
+              <a:t>12/03/2020</a:t>
             </a:fld>
             <a:endParaRPr lang="pt-BR"/>
           </a:p>
@@ -5340,7 +5345,7 @@
           </a:lstStyle>
           <a:p>
             <a:r>
-              <a:rPr lang="pt-BR" smtClean="0"/>
+              <a:rPr lang="pt-BR"/>
               <a:t>Clique para editar o título mestre</a:t>
             </a:r>
             <a:endParaRPr lang="en-US" dirty="0"/>
@@ -5419,7 +5424,7 @@
           </a:lstStyle>
           <a:p>
             <a:r>
-              <a:rPr lang="pt-BR" smtClean="0"/>
+              <a:rPr lang="pt-BR"/>
               <a:t>Clique no ícone para adicionar uma imagem</a:t>
             </a:r>
             <a:endParaRPr lang="en-US" dirty="0"/>
@@ -5487,7 +5492,7 @@
           <a:p>
             <a:pPr lvl="0"/>
             <a:r>
-              <a:rPr lang="pt-BR" smtClean="0"/>
+              <a:rPr lang="pt-BR"/>
               <a:t>Clique para editar o texto mestre</a:t>
             </a:r>
           </a:p>
@@ -5510,7 +5515,7 @@
           <a:p>
             <a:fld id="{599BDDEA-2A2D-4B9B-9399-F97012B02BDC}" type="datetimeFigureOut">
               <a:rPr lang="pt-BR" smtClean="0"/>
-              <a:t>11/03/2020</a:t>
+              <a:t>12/03/2020</a:t>
             </a:fld>
             <a:endParaRPr lang="pt-BR"/>
           </a:p>
@@ -5615,7 +5620,7 @@
           </a:lstStyle>
           <a:p>
             <a:r>
-              <a:rPr lang="pt-BR" smtClean="0"/>
+              <a:rPr lang="pt-BR"/>
               <a:t>Clique para editar o título mestre</a:t>
             </a:r>
             <a:endParaRPr lang="en-US" dirty="0"/>
@@ -5694,7 +5699,7 @@
           </a:lstStyle>
           <a:p>
             <a:r>
-              <a:rPr lang="pt-BR" smtClean="0"/>
+              <a:rPr lang="pt-BR"/>
               <a:t>Clique no ícone para adicionar uma imagem</a:t>
             </a:r>
             <a:endParaRPr lang="en-US" dirty="0"/>
@@ -5762,7 +5767,7 @@
           <a:p>
             <a:pPr lvl="0"/>
             <a:r>
-              <a:rPr lang="pt-BR" smtClean="0"/>
+              <a:rPr lang="pt-BR"/>
               <a:t>Clique para editar o texto mestre</a:t>
             </a:r>
           </a:p>
@@ -5785,7 +5790,7 @@
           <a:p>
             <a:fld id="{599BDDEA-2A2D-4B9B-9399-F97012B02BDC}" type="datetimeFigureOut">
               <a:rPr lang="pt-BR" smtClean="0"/>
-              <a:t>11/03/2020</a:t>
+              <a:t>12/03/2020</a:t>
             </a:fld>
             <a:endParaRPr lang="pt-BR"/>
           </a:p>
@@ -5888,7 +5893,7 @@
           </a:lstStyle>
           <a:p>
             <a:r>
-              <a:rPr lang="pt-BR" smtClean="0"/>
+              <a:rPr lang="pt-BR"/>
               <a:t>Clique para editar o título mestre</a:t>
             </a:r>
             <a:endParaRPr lang="en-US" dirty="0"/>
@@ -5956,7 +5961,7 @@
           <a:p>
             <a:pPr lvl="0"/>
             <a:r>
-              <a:rPr lang="pt-BR" smtClean="0"/>
+              <a:rPr lang="pt-BR"/>
               <a:t>Clique para editar o texto mestre</a:t>
             </a:r>
           </a:p>
@@ -5979,7 +5984,7 @@
           <a:p>
             <a:fld id="{599BDDEA-2A2D-4B9B-9399-F97012B02BDC}" type="datetimeFigureOut">
               <a:rPr lang="pt-BR" smtClean="0"/>
-              <a:t>11/03/2020</a:t>
+              <a:t>12/03/2020</a:t>
             </a:fld>
             <a:endParaRPr lang="pt-BR"/>
           </a:p>
@@ -6082,7 +6087,7 @@
           </a:lstStyle>
           <a:p>
             <a:r>
-              <a:rPr lang="pt-BR" smtClean="0"/>
+              <a:rPr lang="pt-BR"/>
               <a:t>Clique para editar o título mestre</a:t>
             </a:r>
             <a:endParaRPr lang="en-US" dirty="0"/>
@@ -6157,7 +6162,7 @@
           <a:p>
             <a:pPr lvl="0"/>
             <a:r>
-              <a:rPr lang="pt-BR" smtClean="0"/>
+              <a:rPr lang="pt-BR"/>
               <a:t>Clique para editar o texto mestre</a:t>
             </a:r>
           </a:p>
@@ -6224,7 +6229,7 @@
           <a:p>
             <a:pPr lvl="0"/>
             <a:r>
-              <a:rPr lang="pt-BR" smtClean="0"/>
+              <a:rPr lang="pt-BR"/>
               <a:t>Clique para editar o texto mestre</a:t>
             </a:r>
           </a:p>
@@ -6247,7 +6252,7 @@
           <a:p>
             <a:fld id="{599BDDEA-2A2D-4B9B-9399-F97012B02BDC}" type="datetimeFigureOut">
               <a:rPr lang="pt-BR" smtClean="0"/>
-              <a:t>11/03/2020</a:t>
+              <a:t>12/03/2020</a:t>
             </a:fld>
             <a:endParaRPr lang="pt-BR"/>
           </a:p>
@@ -6438,7 +6443,7 @@
           </a:lstStyle>
           <a:p>
             <a:r>
-              <a:rPr lang="pt-BR" smtClean="0"/>
+              <a:rPr lang="pt-BR"/>
               <a:t>Clique para editar o título mestre</a:t>
             </a:r>
             <a:endParaRPr lang="en-US" dirty="0"/>
@@ -6559,7 +6564,7 @@
           <a:p>
             <a:pPr lvl="0"/>
             <a:r>
-              <a:rPr lang="pt-BR" smtClean="0"/>
+              <a:rPr lang="pt-BR"/>
               <a:t>Clique para editar o texto mestre</a:t>
             </a:r>
           </a:p>
@@ -6582,7 +6587,7 @@
           <a:p>
             <a:fld id="{599BDDEA-2A2D-4B9B-9399-F97012B02BDC}" type="datetimeFigureOut">
               <a:rPr lang="pt-BR" smtClean="0"/>
-              <a:t>11/03/2020</a:t>
+              <a:t>12/03/2020</a:t>
             </a:fld>
             <a:endParaRPr lang="pt-BR"/>
           </a:p>
@@ -6685,7 +6690,7 @@
           </a:lstStyle>
           <a:p>
             <a:r>
-              <a:rPr lang="pt-BR" smtClean="0"/>
+              <a:rPr lang="pt-BR"/>
               <a:t>Clique para editar o título mestre</a:t>
             </a:r>
             <a:endParaRPr lang="en-US" dirty="0"/>
@@ -6803,7 +6808,7 @@
           <a:p>
             <a:pPr lvl="0"/>
             <a:r>
-              <a:rPr lang="pt-BR" smtClean="0"/>
+              <a:rPr lang="pt-BR"/>
               <a:t>Clique para editar o texto mestre</a:t>
             </a:r>
           </a:p>
@@ -6826,7 +6831,7 @@
           <a:p>
             <a:fld id="{599BDDEA-2A2D-4B9B-9399-F97012B02BDC}" type="datetimeFigureOut">
               <a:rPr lang="pt-BR" smtClean="0"/>
-              <a:t>11/03/2020</a:t>
+              <a:t>12/03/2020</a:t>
             </a:fld>
             <a:endParaRPr lang="pt-BR"/>
           </a:p>
@@ -6924,7 +6929,7 @@
           </a:lstStyle>
           <a:p>
             <a:r>
-              <a:rPr lang="pt-BR" smtClean="0"/>
+              <a:rPr lang="pt-BR"/>
               <a:t>Clique para editar o título mestre</a:t>
             </a:r>
             <a:endParaRPr lang="en-US" dirty="0"/>
@@ -6996,7 +7001,7 @@
           <a:p>
             <a:pPr lvl="0"/>
             <a:r>
-              <a:rPr lang="pt-BR" smtClean="0"/>
+              <a:rPr lang="pt-BR"/>
               <a:t>Clique para editar o texto mestre</a:t>
             </a:r>
           </a:p>
@@ -7063,7 +7068,7 @@
           <a:p>
             <a:pPr lvl="0"/>
             <a:r>
-              <a:rPr lang="pt-BR" smtClean="0"/>
+              <a:rPr lang="pt-BR"/>
               <a:t>Clique para editar o texto mestre</a:t>
             </a:r>
           </a:p>
@@ -7134,7 +7139,7 @@
           <a:p>
             <a:pPr lvl="0"/>
             <a:r>
-              <a:rPr lang="pt-BR" smtClean="0"/>
+              <a:rPr lang="pt-BR"/>
               <a:t>Clique para editar o texto mestre</a:t>
             </a:r>
           </a:p>
@@ -7201,7 +7206,7 @@
           <a:p>
             <a:pPr lvl="0"/>
             <a:r>
-              <a:rPr lang="pt-BR" smtClean="0"/>
+              <a:rPr lang="pt-BR"/>
               <a:t>Clique para editar o texto mestre</a:t>
             </a:r>
           </a:p>
@@ -7272,7 +7277,7 @@
           <a:p>
             <a:pPr lvl="0"/>
             <a:r>
-              <a:rPr lang="pt-BR" smtClean="0"/>
+              <a:rPr lang="pt-BR"/>
               <a:t>Clique para editar o texto mestre</a:t>
             </a:r>
           </a:p>
@@ -7339,7 +7344,7 @@
           <a:p>
             <a:pPr lvl="0"/>
             <a:r>
-              <a:rPr lang="pt-BR" smtClean="0"/>
+              <a:rPr lang="pt-BR"/>
               <a:t>Clique para editar o texto mestre</a:t>
             </a:r>
           </a:p>
@@ -7436,7 +7441,7 @@
           <a:p>
             <a:fld id="{599BDDEA-2A2D-4B9B-9399-F97012B02BDC}" type="datetimeFigureOut">
               <a:rPr lang="pt-BR" smtClean="0"/>
-              <a:t>11/03/2020</a:t>
+              <a:t>12/03/2020</a:t>
             </a:fld>
             <a:endParaRPr lang="pt-BR"/>
           </a:p>
@@ -7534,7 +7539,7 @@
           </a:lstStyle>
           <a:p>
             <a:r>
-              <a:rPr lang="pt-BR" smtClean="0"/>
+              <a:rPr lang="pt-BR"/>
               <a:t>Clique para editar o título mestre</a:t>
             </a:r>
             <a:endParaRPr lang="en-US" dirty="0"/>
@@ -7606,7 +7611,7 @@
           <a:p>
             <a:pPr lvl="0"/>
             <a:r>
-              <a:rPr lang="pt-BR" smtClean="0"/>
+              <a:rPr lang="pt-BR"/>
               <a:t>Clique para editar o texto mestre</a:t>
             </a:r>
           </a:p>
@@ -7684,7 +7689,7 @@
           </a:lstStyle>
           <a:p>
             <a:r>
-              <a:rPr lang="pt-BR" smtClean="0"/>
+              <a:rPr lang="pt-BR"/>
               <a:t>Clique no ícone para adicionar uma imagem</a:t>
             </a:r>
             <a:endParaRPr lang="en-US" dirty="0"/>
@@ -7752,7 +7757,7 @@
           <a:p>
             <a:pPr lvl="0"/>
             <a:r>
-              <a:rPr lang="pt-BR" smtClean="0"/>
+              <a:rPr lang="pt-BR"/>
               <a:t>Clique para editar o texto mestre</a:t>
             </a:r>
           </a:p>
@@ -7823,7 +7828,7 @@
           <a:p>
             <a:pPr lvl="0"/>
             <a:r>
-              <a:rPr lang="pt-BR" smtClean="0"/>
+              <a:rPr lang="pt-BR"/>
               <a:t>Clique para editar o texto mestre</a:t>
             </a:r>
           </a:p>
@@ -7901,7 +7906,7 @@
           </a:lstStyle>
           <a:p>
             <a:r>
-              <a:rPr lang="pt-BR" smtClean="0"/>
+              <a:rPr lang="pt-BR"/>
               <a:t>Clique no ícone para adicionar uma imagem</a:t>
             </a:r>
             <a:endParaRPr lang="en-US" dirty="0"/>
@@ -7969,7 +7974,7 @@
           <a:p>
             <a:pPr lvl="0"/>
             <a:r>
-              <a:rPr lang="pt-BR" smtClean="0"/>
+              <a:rPr lang="pt-BR"/>
               <a:t>Clique para editar o texto mestre</a:t>
             </a:r>
           </a:p>
@@ -8040,7 +8045,7 @@
           <a:p>
             <a:pPr lvl="0"/>
             <a:r>
-              <a:rPr lang="pt-BR" smtClean="0"/>
+              <a:rPr lang="pt-BR"/>
               <a:t>Clique para editar o texto mestre</a:t>
             </a:r>
           </a:p>
@@ -8118,7 +8123,7 @@
           </a:lstStyle>
           <a:p>
             <a:r>
-              <a:rPr lang="pt-BR" smtClean="0"/>
+              <a:rPr lang="pt-BR"/>
               <a:t>Clique no ícone para adicionar uma imagem</a:t>
             </a:r>
             <a:endParaRPr lang="en-US" dirty="0"/>
@@ -8186,7 +8191,7 @@
           <a:p>
             <a:pPr lvl="0"/>
             <a:r>
-              <a:rPr lang="pt-BR" smtClean="0"/>
+              <a:rPr lang="pt-BR"/>
               <a:t>Clique para editar o texto mestre</a:t>
             </a:r>
           </a:p>
@@ -8283,7 +8288,7 @@
           <a:p>
             <a:fld id="{599BDDEA-2A2D-4B9B-9399-F97012B02BDC}" type="datetimeFigureOut">
               <a:rPr lang="pt-BR" smtClean="0"/>
-              <a:t>11/03/2020</a:t>
+              <a:t>12/03/2020</a:t>
             </a:fld>
             <a:endParaRPr lang="pt-BR"/>
           </a:p>
@@ -8377,7 +8382,7 @@
           <a:lstStyle/>
           <a:p>
             <a:r>
-              <a:rPr lang="pt-BR" smtClean="0"/>
+              <a:rPr lang="pt-BR"/>
               <a:t>Clique para editar o título mestre</a:t>
             </a:r>
             <a:endParaRPr lang="en-US" dirty="0"/>
@@ -8401,35 +8406,35 @@
           <a:p>
             <a:pPr lvl="0"/>
             <a:r>
-              <a:rPr lang="pt-BR" smtClean="0"/>
+              <a:rPr lang="pt-BR"/>
               <a:t>Clique para editar o texto mestre</a:t>
             </a:r>
           </a:p>
           <a:p>
             <a:pPr lvl="1"/>
             <a:r>
-              <a:rPr lang="pt-BR" smtClean="0"/>
+              <a:rPr lang="pt-BR"/>
               <a:t>Segundo nível</a:t>
             </a:r>
           </a:p>
           <a:p>
             <a:pPr lvl="2"/>
             <a:r>
-              <a:rPr lang="pt-BR" smtClean="0"/>
+              <a:rPr lang="pt-BR"/>
               <a:t>Terceiro nível</a:t>
             </a:r>
           </a:p>
           <a:p>
             <a:pPr lvl="3"/>
             <a:r>
-              <a:rPr lang="pt-BR" smtClean="0"/>
+              <a:rPr lang="pt-BR"/>
               <a:t>Quarto nível</a:t>
             </a:r>
           </a:p>
           <a:p>
             <a:pPr lvl="4"/>
             <a:r>
-              <a:rPr lang="pt-BR" smtClean="0"/>
+              <a:rPr lang="pt-BR"/>
               <a:t>Quinto nível</a:t>
             </a:r>
             <a:endParaRPr lang="en-US" dirty="0"/>
@@ -8453,7 +8458,7 @@
           <a:p>
             <a:fld id="{599BDDEA-2A2D-4B9B-9399-F97012B02BDC}" type="datetimeFigureOut">
               <a:rPr lang="pt-BR" smtClean="0"/>
-              <a:t>11/03/2020</a:t>
+              <a:t>12/03/2020</a:t>
             </a:fld>
             <a:endParaRPr lang="pt-BR"/>
           </a:p>
@@ -8552,7 +8557,7 @@
           <a:lstStyle/>
           <a:p>
             <a:r>
-              <a:rPr lang="pt-BR" smtClean="0"/>
+              <a:rPr lang="pt-BR"/>
               <a:t>Clique para editar o título mestre</a:t>
             </a:r>
             <a:endParaRPr lang="en-US" dirty="0"/>
@@ -8581,35 +8586,35 @@
           <a:p>
             <a:pPr lvl="0"/>
             <a:r>
-              <a:rPr lang="pt-BR" smtClean="0"/>
+              <a:rPr lang="pt-BR"/>
               <a:t>Clique para editar o texto mestre</a:t>
             </a:r>
           </a:p>
           <a:p>
             <a:pPr lvl="1"/>
             <a:r>
-              <a:rPr lang="pt-BR" smtClean="0"/>
+              <a:rPr lang="pt-BR"/>
               <a:t>Segundo nível</a:t>
             </a:r>
           </a:p>
           <a:p>
             <a:pPr lvl="2"/>
             <a:r>
-              <a:rPr lang="pt-BR" smtClean="0"/>
+              <a:rPr lang="pt-BR"/>
               <a:t>Terceiro nível</a:t>
             </a:r>
           </a:p>
           <a:p>
             <a:pPr lvl="3"/>
             <a:r>
-              <a:rPr lang="pt-BR" smtClean="0"/>
+              <a:rPr lang="pt-BR"/>
               <a:t>Quarto nível</a:t>
             </a:r>
           </a:p>
           <a:p>
             <a:pPr lvl="4"/>
             <a:r>
-              <a:rPr lang="pt-BR" smtClean="0"/>
+              <a:rPr lang="pt-BR"/>
               <a:t>Quinto nível</a:t>
             </a:r>
             <a:endParaRPr lang="en-US" dirty="0"/>
@@ -8633,7 +8638,7 @@
           <a:p>
             <a:fld id="{599BDDEA-2A2D-4B9B-9399-F97012B02BDC}" type="datetimeFigureOut">
               <a:rPr lang="pt-BR" smtClean="0"/>
-              <a:t>11/03/2020</a:t>
+              <a:t>12/03/2020</a:t>
             </a:fld>
             <a:endParaRPr lang="pt-BR"/>
           </a:p>
@@ -8727,7 +8732,7 @@
           <a:lstStyle/>
           <a:p>
             <a:r>
-              <a:rPr lang="pt-BR" smtClean="0"/>
+              <a:rPr lang="pt-BR"/>
               <a:t>Clique para editar o título mestre</a:t>
             </a:r>
             <a:endParaRPr lang="en-US" dirty="0"/>
@@ -8786,35 +8791,35 @@
           <a:p>
             <a:pPr lvl="0"/>
             <a:r>
-              <a:rPr lang="pt-BR" smtClean="0"/>
+              <a:rPr lang="pt-BR"/>
               <a:t>Clique para editar o texto mestre</a:t>
             </a:r>
           </a:p>
           <a:p>
             <a:pPr lvl="1"/>
             <a:r>
-              <a:rPr lang="pt-BR" smtClean="0"/>
+              <a:rPr lang="pt-BR"/>
               <a:t>Segundo nível</a:t>
             </a:r>
           </a:p>
           <a:p>
             <a:pPr lvl="2"/>
             <a:r>
-              <a:rPr lang="pt-BR" smtClean="0"/>
+              <a:rPr lang="pt-BR"/>
               <a:t>Terceiro nível</a:t>
             </a:r>
           </a:p>
           <a:p>
             <a:pPr lvl="3"/>
             <a:r>
-              <a:rPr lang="pt-BR" smtClean="0"/>
+              <a:rPr lang="pt-BR"/>
               <a:t>Quarto nível</a:t>
             </a:r>
           </a:p>
           <a:p>
             <a:pPr lvl="4"/>
             <a:r>
-              <a:rPr lang="pt-BR" smtClean="0"/>
+              <a:rPr lang="pt-BR"/>
               <a:t>Quinto nível</a:t>
             </a:r>
             <a:endParaRPr lang="en-US" dirty="0"/>
@@ -8873,35 +8878,35 @@
           <a:p>
             <a:pPr lvl="0"/>
             <a:r>
-              <a:rPr lang="pt-BR" smtClean="0"/>
+              <a:rPr lang="pt-BR"/>
               <a:t>Clique para editar o texto mestre</a:t>
             </a:r>
           </a:p>
           <a:p>
             <a:pPr lvl="1"/>
             <a:r>
-              <a:rPr lang="pt-BR" smtClean="0"/>
+              <a:rPr lang="pt-BR"/>
               <a:t>Segundo nível</a:t>
             </a:r>
           </a:p>
           <a:p>
             <a:pPr lvl="2"/>
             <a:r>
-              <a:rPr lang="pt-BR" smtClean="0"/>
+              <a:rPr lang="pt-BR"/>
               <a:t>Terceiro nível</a:t>
             </a:r>
           </a:p>
           <a:p>
             <a:pPr lvl="3"/>
             <a:r>
-              <a:rPr lang="pt-BR" smtClean="0"/>
+              <a:rPr lang="pt-BR"/>
               <a:t>Quarto nível</a:t>
             </a:r>
           </a:p>
           <a:p>
             <a:pPr lvl="4"/>
             <a:r>
-              <a:rPr lang="pt-BR" smtClean="0"/>
+              <a:rPr lang="pt-BR"/>
               <a:t>Quinto nível</a:t>
             </a:r>
             <a:endParaRPr lang="en-US" dirty="0"/>
@@ -8925,7 +8930,7 @@
           <a:p>
             <a:fld id="{599BDDEA-2A2D-4B9B-9399-F97012B02BDC}" type="datetimeFigureOut">
               <a:rPr lang="pt-BR" smtClean="0"/>
-              <a:t>11/03/2020</a:t>
+              <a:t>12/03/2020</a:t>
             </a:fld>
             <a:endParaRPr lang="pt-BR"/>
           </a:p>
@@ -9023,7 +9028,7 @@
           </a:lstStyle>
           <a:p>
             <a:r>
-              <a:rPr lang="pt-BR" smtClean="0"/>
+              <a:rPr lang="pt-BR"/>
               <a:t>Clique para editar o título mestre</a:t>
             </a:r>
             <a:endParaRPr lang="en-US" dirty="0"/>
@@ -9098,7 +9103,7 @@
           <a:p>
             <a:pPr lvl="0"/>
             <a:r>
-              <a:rPr lang="pt-BR" smtClean="0"/>
+              <a:rPr lang="pt-BR"/>
               <a:t>Clique para editar o texto mestre</a:t>
             </a:r>
           </a:p>
@@ -9156,35 +9161,35 @@
           <a:p>
             <a:pPr lvl="0"/>
             <a:r>
-              <a:rPr lang="pt-BR" smtClean="0"/>
+              <a:rPr lang="pt-BR"/>
               <a:t>Clique para editar o texto mestre</a:t>
             </a:r>
           </a:p>
           <a:p>
             <a:pPr lvl="1"/>
             <a:r>
-              <a:rPr lang="pt-BR" smtClean="0"/>
+              <a:rPr lang="pt-BR"/>
               <a:t>Segundo nível</a:t>
             </a:r>
           </a:p>
           <a:p>
             <a:pPr lvl="2"/>
             <a:r>
-              <a:rPr lang="pt-BR" smtClean="0"/>
+              <a:rPr lang="pt-BR"/>
               <a:t>Terceiro nível</a:t>
             </a:r>
           </a:p>
           <a:p>
             <a:pPr lvl="3"/>
             <a:r>
-              <a:rPr lang="pt-BR" smtClean="0"/>
+              <a:rPr lang="pt-BR"/>
               <a:t>Quarto nível</a:t>
             </a:r>
           </a:p>
           <a:p>
             <a:pPr lvl="4"/>
             <a:r>
-              <a:rPr lang="pt-BR" smtClean="0"/>
+              <a:rPr lang="pt-BR"/>
               <a:t>Quinto nível</a:t>
             </a:r>
             <a:endParaRPr lang="en-US" dirty="0"/>
@@ -9259,7 +9264,7 @@
           <a:p>
             <a:pPr lvl="0"/>
             <a:r>
-              <a:rPr lang="pt-BR" smtClean="0"/>
+              <a:rPr lang="pt-BR"/>
               <a:t>Clique para editar o texto mestre</a:t>
             </a:r>
           </a:p>
@@ -9317,35 +9322,35 @@
           <a:p>
             <a:pPr lvl="0"/>
             <a:r>
-              <a:rPr lang="pt-BR" smtClean="0"/>
+              <a:rPr lang="pt-BR"/>
               <a:t>Clique para editar o texto mestre</a:t>
             </a:r>
           </a:p>
           <a:p>
             <a:pPr lvl="1"/>
             <a:r>
-              <a:rPr lang="pt-BR" smtClean="0"/>
+              <a:rPr lang="pt-BR"/>
               <a:t>Segundo nível</a:t>
             </a:r>
           </a:p>
           <a:p>
             <a:pPr lvl="2"/>
             <a:r>
-              <a:rPr lang="pt-BR" smtClean="0"/>
+              <a:rPr lang="pt-BR"/>
               <a:t>Terceiro nível</a:t>
             </a:r>
           </a:p>
           <a:p>
             <a:pPr lvl="3"/>
             <a:r>
-              <a:rPr lang="pt-BR" smtClean="0"/>
+              <a:rPr lang="pt-BR"/>
               <a:t>Quarto nível</a:t>
             </a:r>
           </a:p>
           <a:p>
             <a:pPr lvl="4"/>
             <a:r>
-              <a:rPr lang="pt-BR" smtClean="0"/>
+              <a:rPr lang="pt-BR"/>
               <a:t>Quinto nível</a:t>
             </a:r>
             <a:endParaRPr lang="en-US" dirty="0"/>
@@ -9369,7 +9374,7 @@
           <a:p>
             <a:fld id="{599BDDEA-2A2D-4B9B-9399-F97012B02BDC}" type="datetimeFigureOut">
               <a:rPr lang="pt-BR" smtClean="0"/>
-              <a:t>11/03/2020</a:t>
+              <a:t>12/03/2020</a:t>
             </a:fld>
             <a:endParaRPr lang="pt-BR"/>
           </a:p>
@@ -9463,7 +9468,7 @@
           <a:lstStyle/>
           <a:p>
             <a:r>
-              <a:rPr lang="pt-BR" smtClean="0"/>
+              <a:rPr lang="pt-BR"/>
               <a:t>Clique para editar o título mestre</a:t>
             </a:r>
             <a:endParaRPr lang="en-US" dirty="0"/>
@@ -9487,7 +9492,7 @@
           <a:p>
             <a:fld id="{599BDDEA-2A2D-4B9B-9399-F97012B02BDC}" type="datetimeFigureOut">
               <a:rPr lang="pt-BR" smtClean="0"/>
-              <a:t>11/03/2020</a:t>
+              <a:t>12/03/2020</a:t>
             </a:fld>
             <a:endParaRPr lang="pt-BR"/>
           </a:p>
@@ -9582,7 +9587,7 @@
           <a:p>
             <a:fld id="{599BDDEA-2A2D-4B9B-9399-F97012B02BDC}" type="datetimeFigureOut">
               <a:rPr lang="pt-BR" smtClean="0"/>
-              <a:t>11/03/2020</a:t>
+              <a:t>12/03/2020</a:t>
             </a:fld>
             <a:endParaRPr lang="pt-BR"/>
           </a:p>
@@ -9685,7 +9690,7 @@
           </a:lstStyle>
           <a:p>
             <a:r>
-              <a:rPr lang="pt-BR" smtClean="0"/>
+              <a:rPr lang="pt-BR"/>
               <a:t>Clique para editar o título mestre</a:t>
             </a:r>
             <a:endParaRPr lang="en-US" dirty="0"/>
@@ -9744,35 +9749,35 @@
           <a:p>
             <a:pPr lvl="0"/>
             <a:r>
-              <a:rPr lang="pt-BR" smtClean="0"/>
+              <a:rPr lang="pt-BR"/>
               <a:t>Clique para editar o texto mestre</a:t>
             </a:r>
           </a:p>
           <a:p>
             <a:pPr lvl="1"/>
             <a:r>
-              <a:rPr lang="pt-BR" smtClean="0"/>
+              <a:rPr lang="pt-BR"/>
               <a:t>Segundo nível</a:t>
             </a:r>
           </a:p>
           <a:p>
             <a:pPr lvl="2"/>
             <a:r>
-              <a:rPr lang="pt-BR" smtClean="0"/>
+              <a:rPr lang="pt-BR"/>
               <a:t>Terceiro nível</a:t>
             </a:r>
           </a:p>
           <a:p>
             <a:pPr lvl="3"/>
             <a:r>
-              <a:rPr lang="pt-BR" smtClean="0"/>
+              <a:rPr lang="pt-BR"/>
               <a:t>Quarto nível</a:t>
             </a:r>
           </a:p>
           <a:p>
             <a:pPr lvl="4"/>
             <a:r>
-              <a:rPr lang="pt-BR" smtClean="0"/>
+              <a:rPr lang="pt-BR"/>
               <a:t>Quinto nível</a:t>
             </a:r>
             <a:endParaRPr lang="en-US" dirty="0"/>
@@ -9838,7 +9843,7 @@
           <a:p>
             <a:pPr lvl="0"/>
             <a:r>
-              <a:rPr lang="pt-BR" smtClean="0"/>
+              <a:rPr lang="pt-BR"/>
               <a:t>Clique para editar o texto mestre</a:t>
             </a:r>
           </a:p>
@@ -9861,7 +9866,7 @@
           <a:p>
             <a:fld id="{599BDDEA-2A2D-4B9B-9399-F97012B02BDC}" type="datetimeFigureOut">
               <a:rPr lang="pt-BR" smtClean="0"/>
-              <a:t>11/03/2020</a:t>
+              <a:t>12/03/2020</a:t>
             </a:fld>
             <a:endParaRPr lang="pt-BR"/>
           </a:p>
@@ -9966,7 +9971,7 @@
           </a:lstStyle>
           <a:p>
             <a:r>
-              <a:rPr lang="pt-BR" smtClean="0"/>
+              <a:rPr lang="pt-BR"/>
               <a:t>Clique para editar o título mestre</a:t>
             </a:r>
             <a:endParaRPr lang="en-US" dirty="0"/>
@@ -10045,7 +10050,7 @@
           </a:lstStyle>
           <a:p>
             <a:r>
-              <a:rPr lang="pt-BR" smtClean="0"/>
+              <a:rPr lang="pt-BR"/>
               <a:t>Clique no ícone para adicionar uma imagem</a:t>
             </a:r>
             <a:endParaRPr lang="en-US" dirty="0"/>
@@ -10113,7 +10118,7 @@
           <a:p>
             <a:pPr lvl="0"/>
             <a:r>
-              <a:rPr lang="pt-BR" smtClean="0"/>
+              <a:rPr lang="pt-BR"/>
               <a:t>Clique para editar o texto mestre</a:t>
             </a:r>
           </a:p>
@@ -10136,7 +10141,7 @@
           <a:p>
             <a:fld id="{599BDDEA-2A2D-4B9B-9399-F97012B02BDC}" type="datetimeFigureOut">
               <a:rPr lang="pt-BR" smtClean="0"/>
-              <a:t>11/03/2020</a:t>
+              <a:t>12/03/2020</a:t>
             </a:fld>
             <a:endParaRPr lang="pt-BR"/>
           </a:p>
@@ -10454,7 +10459,7 @@
           <a:lstStyle/>
           <a:p>
             <a:r>
-              <a:rPr lang="pt-BR" smtClean="0"/>
+              <a:rPr lang="pt-BR"/>
               <a:t>Clique para editar o título mestre</a:t>
             </a:r>
             <a:endParaRPr lang="en-US" dirty="0"/>
@@ -10488,35 +10493,35 @@
           <a:p>
             <a:pPr lvl="0"/>
             <a:r>
-              <a:rPr lang="pt-BR" smtClean="0"/>
+              <a:rPr lang="pt-BR"/>
               <a:t>Clique para editar o texto mestre</a:t>
             </a:r>
           </a:p>
           <a:p>
             <a:pPr lvl="1"/>
             <a:r>
-              <a:rPr lang="pt-BR" smtClean="0"/>
+              <a:rPr lang="pt-BR"/>
               <a:t>Segundo nível</a:t>
             </a:r>
           </a:p>
           <a:p>
             <a:pPr lvl="2"/>
             <a:r>
-              <a:rPr lang="pt-BR" smtClean="0"/>
+              <a:rPr lang="pt-BR"/>
               <a:t>Terceiro nível</a:t>
             </a:r>
           </a:p>
           <a:p>
             <a:pPr lvl="3"/>
             <a:r>
-              <a:rPr lang="pt-BR" smtClean="0"/>
+              <a:rPr lang="pt-BR"/>
               <a:t>Quarto nível</a:t>
             </a:r>
           </a:p>
           <a:p>
             <a:pPr lvl="4"/>
             <a:r>
-              <a:rPr lang="pt-BR" smtClean="0"/>
+              <a:rPr lang="pt-BR"/>
               <a:t>Quinto nível</a:t>
             </a:r>
             <a:endParaRPr lang="en-US" dirty="0"/>
@@ -10559,7 +10564,7 @@
           <a:p>
             <a:fld id="{599BDDEA-2A2D-4B9B-9399-F97012B02BDC}" type="datetimeFigureOut">
               <a:rPr lang="pt-BR" smtClean="0"/>
-              <a:t>11/03/2020</a:t>
+              <a:t>12/03/2020</a:t>
             </a:fld>
             <a:endParaRPr lang="pt-BR"/>
           </a:p>
@@ -11333,7 +11338,7 @@
           <a:lstStyle/>
           <a:p>
             <a:r>
-              <a:rPr lang="pt-BR" smtClean="0"/>
+              <a:rPr lang="pt-BR"/>
               <a:t>Clique para editar o título mestre</a:t>
             </a:r>
             <a:endParaRPr lang="en-US" dirty="0"/>
@@ -11367,35 +11372,35 @@
           <a:p>
             <a:pPr lvl="0"/>
             <a:r>
-              <a:rPr lang="pt-BR" smtClean="0"/>
+              <a:rPr lang="pt-BR"/>
               <a:t>Clique para editar o texto mestre</a:t>
             </a:r>
           </a:p>
           <a:p>
             <a:pPr lvl="1"/>
             <a:r>
-              <a:rPr lang="pt-BR" smtClean="0"/>
+              <a:rPr lang="pt-BR"/>
               <a:t>Segundo nível</a:t>
             </a:r>
           </a:p>
           <a:p>
             <a:pPr lvl="2"/>
             <a:r>
-              <a:rPr lang="pt-BR" smtClean="0"/>
+              <a:rPr lang="pt-BR"/>
               <a:t>Terceiro nível</a:t>
             </a:r>
           </a:p>
           <a:p>
             <a:pPr lvl="3"/>
             <a:r>
-              <a:rPr lang="pt-BR" smtClean="0"/>
+              <a:rPr lang="pt-BR"/>
               <a:t>Quarto nível</a:t>
             </a:r>
           </a:p>
           <a:p>
             <a:pPr lvl="4"/>
             <a:r>
-              <a:rPr lang="pt-BR" smtClean="0"/>
+              <a:rPr lang="pt-BR"/>
               <a:t>Quinto nível</a:t>
             </a:r>
             <a:endParaRPr lang="en-US" dirty="0"/>
@@ -11438,7 +11443,7 @@
           <a:p>
             <a:fld id="{599BDDEA-2A2D-4B9B-9399-F97012B02BDC}" type="datetimeFigureOut">
               <a:rPr lang="pt-BR" smtClean="0"/>
-              <a:t>11/03/2020</a:t>
+              <a:t>12/03/2020</a:t>
             </a:fld>
             <a:endParaRPr lang="pt-BR"/>
           </a:p>
@@ -11955,18 +11960,9 @@
           <a:lstStyle/>
           <a:p>
             <a:r>
-              <a:rPr lang="pt-BR" dirty="0" smtClean="0"/>
-              <a:t>Ações </a:t>
-            </a:r>
-            <a:r>
               <a:rPr lang="pt-BR" dirty="0"/>
-              <a:t>Beneficentes</a:t>
-            </a:r>
-            <a:r>
-              <a:rPr lang="pt-BR" dirty="0" smtClean="0"/>
-              <a:t> de Empresas</a:t>
-            </a:r>
-            <a:endParaRPr lang="pt-BR" dirty="0"/>
+              <a:t>Ações Beneficentes de Empresas</a:t>
+            </a:r>
           </a:p>
         </p:txBody>
       </p:sp>
@@ -11986,10 +11982,9 @@
           <a:lstStyle/>
           <a:p>
             <a:r>
-              <a:rPr lang="pt-BR" dirty="0" smtClean="0"/>
+              <a:rPr lang="pt-BR" dirty="0"/>
               <a:t>Responsabilidade ambiental para com o mundo</a:t>
             </a:r>
-            <a:endParaRPr lang="pt-BR" dirty="0"/>
           </a:p>
         </p:txBody>
       </p:sp>
@@ -12016,7 +12011,7 @@
           <a:lstStyle/>
           <a:p>
             <a:r>
-              <a:rPr lang="pt-BR" sz="1600" b="1" u="sng" dirty="0" smtClean="0">
+              <a:rPr lang="pt-BR" sz="1600" b="1" u="sng" dirty="0">
                 <a:solidFill>
                   <a:schemeClr val="bg1"/>
                 </a:solidFill>
@@ -12030,7 +12025,7 @@
               <a:buChar char="v"/>
             </a:pPr>
             <a:r>
-              <a:rPr lang="pt-BR" sz="1600" b="1" dirty="0" smtClean="0">
+              <a:rPr lang="pt-BR" sz="1600" b="1" dirty="0">
                 <a:solidFill>
                   <a:schemeClr val="bg1"/>
                 </a:solidFill>
@@ -12044,7 +12039,7 @@
               <a:buChar char="v"/>
             </a:pPr>
             <a:r>
-              <a:rPr lang="pt-BR" sz="1600" b="1" dirty="0" smtClean="0">
+              <a:rPr lang="pt-BR" sz="1600" b="1" dirty="0">
                 <a:solidFill>
                   <a:schemeClr val="bg1"/>
                 </a:solidFill>
@@ -12058,7 +12053,7 @@
               <a:buChar char="v"/>
             </a:pPr>
             <a:r>
-              <a:rPr lang="pt-BR" sz="1600" b="1" dirty="0" smtClean="0">
+              <a:rPr lang="pt-BR" sz="1600" b="1" dirty="0">
                 <a:solidFill>
                   <a:schemeClr val="bg1"/>
                 </a:solidFill>
@@ -12072,7 +12067,7 @@
               <a:buChar char="v"/>
             </a:pPr>
             <a:r>
-              <a:rPr lang="pt-BR" sz="1600" b="1" dirty="0" smtClean="0">
+              <a:rPr lang="pt-BR" sz="1600" b="1" dirty="0">
                 <a:solidFill>
                   <a:schemeClr val="bg1"/>
                 </a:solidFill>
@@ -12081,7 +12076,7 @@
             </a:r>
           </a:p>
           <a:p>
-            <a:endParaRPr lang="pt-BR" dirty="0" smtClean="0"/>
+            <a:endParaRPr lang="pt-BR" dirty="0"/>
           </a:p>
           <a:p>
             <a:endParaRPr lang="pt-BR" dirty="0"/>
@@ -12098,13 +12093,6 @@
   <p:clrMapOvr>
     <a:masterClrMapping/>
   </p:clrMapOvr>
-  <p:timing>
-    <p:tnLst>
-      <p:par>
-        <p:cTn id="1" dur="indefinite" restart="never" nodeType="tmRoot"/>
-      </p:par>
-    </p:tnLst>
-  </p:timing>
 </p:sld>
 </file>
 
@@ -12142,10 +12130,9 @@
           <a:p>
             <a:pPr algn="ctr"/>
             <a:r>
-              <a:rPr lang="pt-BR" dirty="0" smtClean="0"/>
+              <a:rPr lang="pt-BR" dirty="0"/>
               <a:t>CPFL (Companhia Paulista de Força e Luz)</a:t>
             </a:r>
-            <a:endParaRPr lang="pt-BR" dirty="0"/>
           </a:p>
         </p:txBody>
       </p:sp>
@@ -12188,13 +12175,6 @@
   <p:clrMapOvr>
     <a:masterClrMapping/>
   </p:clrMapOvr>
-  <p:timing>
-    <p:tnLst>
-      <p:par>
-        <p:cTn id="1" dur="indefinite" restart="never" nodeType="tmRoot"/>
-      </p:par>
-    </p:tnLst>
-  </p:timing>
 </p:sld>
 </file>
 
@@ -12237,10 +12217,9 @@
           <a:p>
             <a:pPr algn="ctr"/>
             <a:r>
-              <a:rPr lang="pt-BR" dirty="0" smtClean="0"/>
+              <a:rPr lang="pt-BR" dirty="0"/>
               <a:t>CPFL - Energia</a:t>
             </a:r>
-            <a:endParaRPr lang="pt-BR" dirty="0"/>
           </a:p>
         </p:txBody>
       </p:sp>
@@ -12256,7 +12235,7 @@
         </p:nvSpPr>
         <p:spPr>
           <a:xfrm>
-            <a:off x="1189373" y="2044924"/>
+            <a:off x="1326675" y="2209519"/>
             <a:ext cx="4396339" cy="4195763"/>
           </a:xfrm>
         </p:spPr>
@@ -12265,7 +12244,7 @@
           <a:lstStyle/>
           <a:p>
             <a:r>
-              <a:rPr lang="pt-BR" dirty="0" smtClean="0"/>
+              <a:rPr lang="pt-BR" dirty="0"/>
               <a:t>História da Empresa:</a:t>
             </a:r>
           </a:p>
@@ -12275,8 +12254,8 @@
               <a:buChar char="q"/>
             </a:pPr>
             <a:r>
-              <a:rPr lang="pt-BR" dirty="0" smtClean="0"/>
-              <a:t>União de  4 pequenas empresas;</a:t>
+              <a:rPr lang="pt-BR" dirty="0"/>
+              <a:t>José Balbino e Manfredo Antônio;</a:t>
             </a:r>
           </a:p>
           <a:p>
@@ -12285,8 +12264,8 @@
               <a:buChar char="q"/>
             </a:pPr>
             <a:r>
-              <a:rPr lang="pt-BR" dirty="0" smtClean="0"/>
-              <a:t>Subsidio Estatal;</a:t>
+              <a:rPr lang="pt-BR" dirty="0"/>
+              <a:t>União de  4 pequenas empresas;</a:t>
             </a:r>
           </a:p>
           <a:p>
@@ -12295,8 +12274,28 @@
               <a:buChar char="q"/>
             </a:pPr>
             <a:r>
-              <a:rPr lang="pt-BR" dirty="0" smtClean="0"/>
-              <a:t>Privatização</a:t>
+              <a:rPr lang="pt-BR" dirty="0"/>
+              <a:t>Privatização Estrangeira;</a:t>
+            </a:r>
+          </a:p>
+          <a:p>
+            <a:pPr lvl="1">
+              <a:buFont typeface="Wingdings" panose="05000000000000000000" pitchFamily="2" charset="2"/>
+              <a:buChar char="q"/>
+            </a:pPr>
+            <a:r>
+              <a:rPr lang="pt-BR" dirty="0"/>
+              <a:t>Estatização pela Eletrobrás;</a:t>
+            </a:r>
+          </a:p>
+          <a:p>
+            <a:pPr lvl="1">
+              <a:buFont typeface="Wingdings" panose="05000000000000000000" pitchFamily="2" charset="2"/>
+              <a:buChar char="q"/>
+            </a:pPr>
+            <a:r>
+              <a:rPr lang="pt-BR" dirty="0"/>
+              <a:t>Grupo VBC</a:t>
             </a:r>
           </a:p>
         </p:txBody>
@@ -12313,7 +12312,7 @@
         </p:nvSpPr>
         <p:spPr>
           <a:xfrm>
-            <a:off x="6784046" y="2040442"/>
+            <a:off x="6784045" y="2205037"/>
             <a:ext cx="4396341" cy="4200245"/>
           </a:xfrm>
         </p:spPr>
@@ -12322,7 +12321,7 @@
           <a:lstStyle/>
           <a:p>
             <a:r>
-              <a:rPr lang="pt-BR" dirty="0" smtClean="0"/>
+              <a:rPr lang="pt-BR" dirty="0"/>
               <a:t>Responsabilidade Social:</a:t>
             </a:r>
           </a:p>
@@ -12332,7 +12331,7 @@
               <a:buChar char="o"/>
             </a:pPr>
             <a:r>
-              <a:rPr lang="pt-BR" dirty="0" smtClean="0"/>
+              <a:rPr lang="pt-BR" dirty="0"/>
               <a:t>Ambiental </a:t>
             </a:r>
           </a:p>
@@ -12342,7 +12341,7 @@
               <a:buChar char="q"/>
             </a:pPr>
             <a:r>
-              <a:rPr lang="pt-BR" dirty="0" smtClean="0"/>
+              <a:rPr lang="pt-BR" dirty="0"/>
               <a:t>Utilização de Energia Sustentável;</a:t>
             </a:r>
           </a:p>
@@ -12352,7 +12351,7 @@
               <a:buChar char="q"/>
             </a:pPr>
             <a:r>
-              <a:rPr lang="pt-BR" dirty="0" smtClean="0"/>
+              <a:rPr lang="pt-BR" dirty="0"/>
               <a:t>Menor emissão de gases poluentes;</a:t>
             </a:r>
           </a:p>
@@ -12362,17 +12361,210 @@
               <a:buChar char="q"/>
             </a:pPr>
             <a:r>
-              <a:rPr lang="pt-BR" dirty="0" smtClean="0"/>
-              <a:t>Menor Impactos ao meio ambiente;</a:t>
-            </a:r>
+              <a:rPr lang="pt-BR" dirty="0"/>
+              <a:t>95,6% de fontes renováveis;</a:t>
+            </a:r>
+          </a:p>
+          <a:p>
+            <a:pPr lvl="1">
+              <a:buFont typeface="Wingdings" panose="05000000000000000000" pitchFamily="2" charset="2"/>
+              <a:buChar char="q"/>
+            </a:pPr>
+            <a:r>
+              <a:rPr lang="pt-BR" dirty="0"/>
+              <a:t>Menor Impactos ao meio ambiente</a:t>
+            </a:r>
+          </a:p>
+          <a:p>
+            <a:pPr lvl="1"/>
             <a:endParaRPr lang="pt-BR" dirty="0"/>
           </a:p>
-          <a:p>
-            <a:pPr lvl="1"/>
-            <a:endParaRPr lang="pt-BR" dirty="0" smtClean="0"/>
-          </a:p>
-        </p:txBody>
-      </p:sp>
+        </p:txBody>
+      </p:sp>
+      <p:sp>
+        <p:nvSpPr>
+          <p:cNvPr id="2" name="CaixaDeTexto 1">
+            <a:extLst>
+              <a:ext uri="{FF2B5EF4-FFF2-40B4-BE49-F238E27FC236}">
+                <a16:creationId xmlns:a16="http://schemas.microsoft.com/office/drawing/2014/main" id="{E86A9DE7-1AAA-4C1A-8357-6A49C346283F}"/>
+              </a:ext>
+            </a:extLst>
+          </p:cNvPr>
+          <p:cNvSpPr txBox="1"/>
+          <p:nvPr/>
+        </p:nvSpPr>
+        <p:spPr>
+          <a:xfrm>
+            <a:off x="1799657" y="4650956"/>
+            <a:ext cx="4734560" cy="1754326"/>
+          </a:xfrm>
+          <a:prstGeom prst="rect">
+            <a:avLst/>
+          </a:prstGeom>
+          <a:noFill/>
+        </p:spPr>
+        <p:txBody>
+          <a:bodyPr wrap="square" rtlCol="0">
+            <a:spAutoFit/>
+          </a:bodyPr>
+          <a:lstStyle/>
+          <a:p>
+            <a:r>
+              <a:rPr lang="pt-BR" dirty="0"/>
+              <a:t>Empresa Força e Luz de Botucatu; Empresa Força e Luz de São Manoel; Empresa Força e Luz de Agudos-Pederneiras;</a:t>
+            </a:r>
+          </a:p>
+          <a:p>
+            <a:r>
+              <a:rPr lang="pt-BR" dirty="0"/>
+              <a:t>Companhia Elétrica do Oeste de São Paulo</a:t>
+            </a:r>
+          </a:p>
+        </p:txBody>
+      </p:sp>
+      <p:sp>
+        <p:nvSpPr>
+          <p:cNvPr id="3" name="Sinal de Adição 2">
+            <a:extLst>
+              <a:ext uri="{FF2B5EF4-FFF2-40B4-BE49-F238E27FC236}">
+                <a16:creationId xmlns:a16="http://schemas.microsoft.com/office/drawing/2014/main" id="{0D08DB1A-8105-4F70-80DF-ADDF7A9ACE35}"/>
+              </a:ext>
+            </a:extLst>
+          </p:cNvPr>
+          <p:cNvSpPr/>
+          <p:nvPr/>
+        </p:nvSpPr>
+        <p:spPr>
+          <a:xfrm>
+            <a:off x="522244" y="5032980"/>
+            <a:ext cx="914400" cy="914400"/>
+          </a:xfrm>
+          <a:prstGeom prst="mathPlus">
+            <a:avLst/>
+          </a:prstGeom>
+        </p:spPr>
+        <p:style>
+          <a:lnRef idx="2">
+            <a:schemeClr val="accent1">
+              <a:shade val="50000"/>
+            </a:schemeClr>
+          </a:lnRef>
+          <a:fillRef idx="1">
+            <a:schemeClr val="accent1"/>
+          </a:fillRef>
+          <a:effectRef idx="0">
+            <a:schemeClr val="accent1"/>
+          </a:effectRef>
+          <a:fontRef idx="minor">
+            <a:schemeClr val="lt1"/>
+          </a:fontRef>
+        </p:style>
+        <p:txBody>
+          <a:bodyPr rtlCol="0" anchor="ctr"/>
+          <a:lstStyle/>
+          <a:p>
+            <a:pPr algn="ctr"/>
+            <a:endParaRPr lang="pt-BR"/>
+          </a:p>
+        </p:txBody>
+      </p:sp>
+      <p:sp>
+        <p:nvSpPr>
+          <p:cNvPr id="7" name="Igual a 6">
+            <a:extLst>
+              <a:ext uri="{FF2B5EF4-FFF2-40B4-BE49-F238E27FC236}">
+                <a16:creationId xmlns:a16="http://schemas.microsoft.com/office/drawing/2014/main" id="{46715A61-471A-416A-B61F-F6EF066F07DC}"/>
+              </a:ext>
+            </a:extLst>
+          </p:cNvPr>
+          <p:cNvSpPr/>
+          <p:nvPr/>
+        </p:nvSpPr>
+        <p:spPr>
+          <a:xfrm>
+            <a:off x="6284388" y="5118432"/>
+            <a:ext cx="1198334" cy="727798"/>
+          </a:xfrm>
+          <a:prstGeom prst="mathEqual">
+            <a:avLst/>
+          </a:prstGeom>
+        </p:spPr>
+        <p:style>
+          <a:lnRef idx="2">
+            <a:schemeClr val="accent1">
+              <a:shade val="50000"/>
+            </a:schemeClr>
+          </a:lnRef>
+          <a:fillRef idx="1">
+            <a:schemeClr val="accent1"/>
+          </a:fillRef>
+          <a:effectRef idx="0">
+            <a:schemeClr val="accent1"/>
+          </a:effectRef>
+          <a:fontRef idx="minor">
+            <a:schemeClr val="lt1"/>
+          </a:fontRef>
+        </p:style>
+        <p:txBody>
+          <a:bodyPr rtlCol="0" anchor="ctr"/>
+          <a:lstStyle/>
+          <a:p>
+            <a:pPr algn="ctr"/>
+            <a:endParaRPr lang="pt-BR">
+              <a:solidFill>
+                <a:schemeClr val="tx1"/>
+              </a:solidFill>
+            </a:endParaRPr>
+          </a:p>
+        </p:txBody>
+      </p:sp>
+      <p:pic>
+        <p:nvPicPr>
+          <p:cNvPr id="1026" name="Picture 2">
+            <a:extLst>
+              <a:ext uri="{FF2B5EF4-FFF2-40B4-BE49-F238E27FC236}">
+                <a16:creationId xmlns:a16="http://schemas.microsoft.com/office/drawing/2014/main" id="{826EB41D-EDA5-4CA7-B9F5-F136E3515B8D}"/>
+              </a:ext>
+            </a:extLst>
+          </p:cNvPr>
+          <p:cNvPicPr>
+            <a:picLocks noChangeAspect="1" noChangeArrowheads="1"/>
+          </p:cNvPicPr>
+          <p:nvPr/>
+        </p:nvPicPr>
+        <p:blipFill>
+          <a:blip r:embed="rId2">
+            <a:extLst>
+              <a:ext uri="{28A0092B-C50C-407E-A947-70E740481C1C}">
+                <a14:useLocalDpi xmlns:a14="http://schemas.microsoft.com/office/drawing/2010/main" val="0"/>
+              </a:ext>
+            </a:extLst>
+          </a:blip>
+          <a:srcRect/>
+          <a:stretch>
+            <a:fillRect/>
+          </a:stretch>
+        </p:blipFill>
+        <p:spPr bwMode="auto">
+          <a:xfrm>
+            <a:off x="8029716" y="4635227"/>
+            <a:ext cx="1905000" cy="1466850"/>
+          </a:xfrm>
+          <a:prstGeom prst="rect">
+            <a:avLst/>
+          </a:prstGeom>
+          <a:noFill/>
+          <a:extLst>
+            <a:ext uri="{909E8E84-426E-40DD-AFC4-6F175D3DCCD1}">
+              <a14:hiddenFill xmlns:a14="http://schemas.microsoft.com/office/drawing/2010/main">
+                <a:solidFill>
+                  <a:srgbClr val="FFFFFF"/>
+                </a:solidFill>
+              </a14:hiddenFill>
+            </a:ext>
+          </a:extLst>
+        </p:spPr>
+      </p:pic>
     </p:spTree>
     <p:extLst>
       <p:ext uri="{BB962C8B-B14F-4D97-AF65-F5344CB8AC3E}">
@@ -12383,13 +12575,6 @@
   <p:clrMapOvr>
     <a:masterClrMapping/>
   </p:clrMapOvr>
-  <p:timing>
-    <p:tnLst>
-      <p:par>
-        <p:cTn id="1" dur="indefinite" restart="never" nodeType="tmRoot"/>
-      </p:par>
-    </p:tnLst>
-  </p:timing>
 </p:sld>
 </file>
 
@@ -12427,67 +12612,111 @@
           <a:p>
             <a:pPr algn="ctr"/>
             <a:r>
-              <a:rPr lang="pt-BR" dirty="0" smtClean="0"/>
+              <a:rPr lang="pt-BR" dirty="0"/>
               <a:t>CPFL - Energia</a:t>
             </a:r>
+          </a:p>
+        </p:txBody>
+      </p:sp>
+      <p:sp>
+        <p:nvSpPr>
+          <p:cNvPr id="5" name="Espaço Reservado para Conteúdo 4"/>
+          <p:cNvSpPr>
+            <a:spLocks noGrp="1"/>
+          </p:cNvSpPr>
+          <p:nvPr>
+            <p:ph sz="half" idx="1"/>
+          </p:nvPr>
+        </p:nvSpPr>
+        <p:spPr/>
+        <p:txBody>
+          <a:bodyPr>
+            <a:normAutofit/>
+          </a:bodyPr>
+          <a:lstStyle/>
+          <a:p>
+            <a:r>
+              <a:rPr lang="pt-BR" dirty="0"/>
+              <a:t>Onde é aplicada?</a:t>
+            </a:r>
+          </a:p>
+          <a:p>
+            <a:pPr lvl="1">
+              <a:buFont typeface="Wingdings" panose="05000000000000000000" pitchFamily="2" charset="2"/>
+              <a:buChar char="q"/>
+            </a:pPr>
+            <a:r>
+              <a:rPr lang="pt-BR" dirty="0"/>
+              <a:t>Geração de Energia Limpa</a:t>
+            </a:r>
+          </a:p>
+          <a:p>
             <a:endParaRPr lang="pt-BR" dirty="0"/>
           </a:p>
-        </p:txBody>
-      </p:sp>
-      <p:sp>
-        <p:nvSpPr>
-          <p:cNvPr id="5" name="Espaço Reservado para Conteúdo 4"/>
-          <p:cNvSpPr>
-            <a:spLocks noGrp="1"/>
-          </p:cNvSpPr>
-          <p:nvPr>
-            <p:ph sz="half" idx="1"/>
-          </p:nvPr>
-        </p:nvSpPr>
-        <p:spPr/>
-        <p:txBody>
-          <a:bodyPr/>
-          <a:lstStyle/>
-          <a:p>
-            <a:r>
-              <a:rPr lang="pt-BR" dirty="0" smtClean="0"/>
-              <a:t>Onde é aplicada?</a:t>
-            </a:r>
-          </a:p>
-          <a:p>
-            <a:pPr lvl="1"/>
-            <a:r>
-              <a:rPr lang="pt-BR" dirty="0" smtClean="0"/>
-              <a:t>Brasil;</a:t>
-            </a:r>
-          </a:p>
-          <a:p>
-            <a:pPr lvl="1"/>
-            <a:r>
-              <a:rPr lang="pt-BR" dirty="0" smtClean="0"/>
-              <a:t>Estado de São Paulo;</a:t>
-            </a:r>
-          </a:p>
-          <a:p>
-            <a:endParaRPr lang="pt-BR" dirty="0"/>
-          </a:p>
-          <a:p>
-            <a:endParaRPr lang="pt-BR" dirty="0" smtClean="0"/>
-          </a:p>
-          <a:p>
-            <a:endParaRPr lang="pt-BR" dirty="0" smtClean="0"/>
-          </a:p>
-          <a:p>
-            <a:r>
-              <a:rPr lang="pt-BR" dirty="0" smtClean="0"/>
+          <a:p>
+            <a:r>
+              <a:rPr lang="pt-BR" dirty="0"/>
               <a:t>Como aplicada?</a:t>
             </a:r>
           </a:p>
           <a:p>
-            <a:pPr lvl="1"/>
-            <a:r>
-              <a:rPr lang="pt-BR" dirty="0" smtClean="0"/>
-              <a:t>Geração de Energia Limpa</a:t>
+            <a:pPr lvl="1">
+              <a:buFont typeface="Wingdings" panose="05000000000000000000" pitchFamily="2" charset="2"/>
+              <a:buChar char="q"/>
+            </a:pPr>
+            <a:r>
+              <a:rPr lang="pt-BR" dirty="0"/>
+              <a:t>Utilização de:</a:t>
+            </a:r>
+          </a:p>
+          <a:p>
+            <a:pPr lvl="2">
+              <a:buFont typeface="Courier New" panose="02070309020205020404" pitchFamily="49" charset="0"/>
+              <a:buChar char="o"/>
+            </a:pPr>
+            <a:r>
+              <a:rPr lang="pt-BR" dirty="0"/>
+              <a:t>50 Centros Hidrelétricas;</a:t>
+            </a:r>
+          </a:p>
+          <a:p>
+            <a:pPr lvl="2">
+              <a:buFont typeface="Courier New" panose="02070309020205020404" pitchFamily="49" charset="0"/>
+              <a:buChar char="o"/>
+            </a:pPr>
+            <a:r>
+              <a:rPr lang="pt-BR" dirty="0"/>
+              <a:t>1 Termelétrica;</a:t>
+            </a:r>
+          </a:p>
+          <a:p>
+            <a:pPr lvl="2">
+              <a:buFont typeface="Courier New" panose="02070309020205020404" pitchFamily="49" charset="0"/>
+              <a:buChar char="o"/>
+            </a:pPr>
+            <a:r>
+              <a:rPr lang="pt-BR" dirty="0"/>
+              <a:t>45 Parques Eólicos;</a:t>
+            </a:r>
+          </a:p>
+          <a:p>
+            <a:pPr lvl="2">
+              <a:buFont typeface="Courier New" panose="02070309020205020404" pitchFamily="49" charset="0"/>
+              <a:buChar char="o"/>
+            </a:pPr>
+            <a:r>
+              <a:rPr lang="pt-BR" dirty="0"/>
+              <a:t>8 Usinas a Biomassa;</a:t>
+            </a:r>
+          </a:p>
+          <a:p>
+            <a:pPr lvl="2">
+              <a:buFont typeface="Courier New" panose="02070309020205020404" pitchFamily="49" charset="0"/>
+              <a:buChar char="o"/>
+            </a:pPr>
+            <a:r>
+              <a:rPr lang="pt-BR" dirty="0"/>
+              <a:t>1 Usina Solar Fotovoltaica</a:t>
             </a:r>
           </a:p>
         </p:txBody>
@@ -12502,25 +12731,251 @@
             <p:ph sz="half" idx="2"/>
           </p:nvPr>
         </p:nvSpPr>
-        <p:spPr/>
-        <p:txBody>
-          <a:bodyPr/>
-          <a:lstStyle/>
-          <a:p>
-            <a:r>
-              <a:rPr lang="pt-BR" dirty="0" smtClean="0"/>
+        <p:spPr>
+          <a:xfrm>
+            <a:off x="6096000" y="2056093"/>
+            <a:ext cx="4396341" cy="4200245"/>
+          </a:xfrm>
+        </p:spPr>
+        <p:txBody>
+          <a:bodyPr>
+            <a:normAutofit/>
+          </a:bodyPr>
+          <a:lstStyle/>
+          <a:p>
+            <a:r>
+              <a:rPr lang="pt-BR" dirty="0"/>
               <a:t>Pra quem?</a:t>
             </a:r>
           </a:p>
           <a:p>
-            <a:pPr lvl="1"/>
-            <a:r>
-              <a:rPr lang="pt-BR" dirty="0" smtClean="0"/>
-              <a:t>População  em geral do Brasil</a:t>
-            </a:r>
-          </a:p>
-        </p:txBody>
-      </p:sp>
+            <a:pPr lvl="1">
+              <a:buFont typeface="Wingdings" panose="05000000000000000000" pitchFamily="2" charset="2"/>
+              <a:buChar char="q"/>
+            </a:pPr>
+            <a:r>
+              <a:rPr lang="pt-BR" dirty="0"/>
+              <a:t>687 municípios;</a:t>
+            </a:r>
+          </a:p>
+          <a:p>
+            <a:pPr lvl="1">
+              <a:buFont typeface="Wingdings" panose="05000000000000000000" pitchFamily="2" charset="2"/>
+              <a:buChar char="q"/>
+            </a:pPr>
+            <a:r>
+              <a:rPr lang="pt-BR" dirty="0"/>
+              <a:t>208300 km²;</a:t>
+            </a:r>
+          </a:p>
+          <a:p>
+            <a:pPr lvl="1">
+              <a:buFont typeface="Wingdings" panose="05000000000000000000" pitchFamily="2" charset="2"/>
+              <a:buChar char="q"/>
+            </a:pPr>
+            <a:r>
+              <a:rPr lang="pt-BR" dirty="0"/>
+              <a:t>Nos estados:</a:t>
+            </a:r>
+          </a:p>
+          <a:p>
+            <a:pPr lvl="2">
+              <a:buFont typeface="Courier New" panose="02070309020205020404" pitchFamily="49" charset="0"/>
+              <a:buChar char="o"/>
+            </a:pPr>
+            <a:r>
+              <a:rPr lang="pt-BR" dirty="0"/>
+              <a:t>São Paulo;</a:t>
+            </a:r>
+          </a:p>
+          <a:p>
+            <a:pPr lvl="2">
+              <a:buFont typeface="Courier New" panose="02070309020205020404" pitchFamily="49" charset="0"/>
+              <a:buChar char="o"/>
+            </a:pPr>
+            <a:r>
+              <a:rPr lang="pt-BR" dirty="0"/>
+              <a:t>Rio Grande do Sul;</a:t>
+            </a:r>
+          </a:p>
+          <a:p>
+            <a:pPr lvl="2">
+              <a:buFont typeface="Courier New" panose="02070309020205020404" pitchFamily="49" charset="0"/>
+              <a:buChar char="o"/>
+            </a:pPr>
+            <a:r>
+              <a:rPr lang="pt-BR" dirty="0"/>
+              <a:t>Paraná;</a:t>
+            </a:r>
+          </a:p>
+          <a:p>
+            <a:pPr lvl="2">
+              <a:buFont typeface="Courier New" panose="02070309020205020404" pitchFamily="49" charset="0"/>
+              <a:buChar char="o"/>
+            </a:pPr>
+            <a:r>
+              <a:rPr lang="pt-BR" dirty="0"/>
+              <a:t>Minas Gerais</a:t>
+            </a:r>
+          </a:p>
+        </p:txBody>
+      </p:sp>
+      <p:pic>
+        <p:nvPicPr>
+          <p:cNvPr id="2050" name="Picture 2" descr="Resultado de imagem para usina hidrelétrica monjolinho">
+            <a:extLst>
+              <a:ext uri="{FF2B5EF4-FFF2-40B4-BE49-F238E27FC236}">
+                <a16:creationId xmlns:a16="http://schemas.microsoft.com/office/drawing/2014/main" id="{40163CB0-3FB6-44CC-9CBD-48525A0D5345}"/>
+              </a:ext>
+            </a:extLst>
+          </p:cNvPr>
+          <p:cNvPicPr>
+            <a:picLocks noChangeAspect="1" noChangeArrowheads="1"/>
+          </p:cNvPicPr>
+          <p:nvPr/>
+        </p:nvPicPr>
+        <p:blipFill>
+          <a:blip r:embed="rId2">
+            <a:extLst>
+              <a:ext uri="{28A0092B-C50C-407E-A947-70E740481C1C}">
+                <a14:useLocalDpi xmlns:a14="http://schemas.microsoft.com/office/drawing/2010/main" val="0"/>
+              </a:ext>
+            </a:extLst>
+          </a:blip>
+          <a:srcRect/>
+          <a:stretch>
+            <a:fillRect/>
+          </a:stretch>
+        </p:blipFill>
+        <p:spPr bwMode="auto">
+          <a:xfrm>
+            <a:off x="9048846" y="1666875"/>
+            <a:ext cx="2600325" cy="1762125"/>
+          </a:xfrm>
+          <a:prstGeom prst="ellipse">
+            <a:avLst/>
+          </a:prstGeom>
+          <a:ln>
+            <a:noFill/>
+          </a:ln>
+          <a:effectLst>
+            <a:softEdge rad="112500"/>
+          </a:effectLst>
+          <a:extLst>
+            <a:ext uri="{909E8E84-426E-40DD-AFC4-6F175D3DCCD1}">
+              <a14:hiddenFill xmlns:a14="http://schemas.microsoft.com/office/drawing/2010/main">
+                <a:solidFill>
+                  <a:srgbClr val="FFFFFF"/>
+                </a:solidFill>
+              </a14:hiddenFill>
+            </a:ext>
+          </a:extLst>
+        </p:spPr>
+      </p:pic>
+      <p:pic>
+        <p:nvPicPr>
+          <p:cNvPr id="2052" name="Picture 4" descr="Resultado de imagem para parque eolico CPFL">
+            <a:extLst>
+              <a:ext uri="{FF2B5EF4-FFF2-40B4-BE49-F238E27FC236}">
+                <a16:creationId xmlns:a16="http://schemas.microsoft.com/office/drawing/2014/main" id="{55D02DE9-542C-4630-BC14-046BD8D37698}"/>
+              </a:ext>
+            </a:extLst>
+          </p:cNvPr>
+          <p:cNvPicPr>
+            <a:picLocks noChangeAspect="1" noChangeArrowheads="1"/>
+          </p:cNvPicPr>
+          <p:nvPr/>
+        </p:nvPicPr>
+        <p:blipFill>
+          <a:blip r:embed="rId3">
+            <a:extLst>
+              <a:ext uri="{28A0092B-C50C-407E-A947-70E740481C1C}">
+                <a14:useLocalDpi xmlns:a14="http://schemas.microsoft.com/office/drawing/2010/main" val="0"/>
+              </a:ext>
+            </a:extLst>
+          </a:blip>
+          <a:srcRect/>
+          <a:stretch>
+            <a:fillRect/>
+          </a:stretch>
+        </p:blipFill>
+        <p:spPr bwMode="auto">
+          <a:xfrm>
+            <a:off x="9182196" y="4151911"/>
+            <a:ext cx="2466975" cy="1847850"/>
+          </a:xfrm>
+          <a:prstGeom prst="ellipse">
+            <a:avLst/>
+          </a:prstGeom>
+          <a:ln>
+            <a:noFill/>
+          </a:ln>
+          <a:effectLst>
+            <a:softEdge rad="112500"/>
+          </a:effectLst>
+          <a:extLst>
+            <a:ext uri="{909E8E84-426E-40DD-AFC4-6F175D3DCCD1}">
+              <a14:hiddenFill xmlns:a14="http://schemas.microsoft.com/office/drawing/2010/main">
+                <a:solidFill>
+                  <a:srgbClr val="FFFFFF"/>
+                </a:solidFill>
+              </a14:hiddenFill>
+            </a:ext>
+          </a:extLst>
+        </p:spPr>
+      </p:pic>
+      <p:pic>
+        <p:nvPicPr>
+          <p:cNvPr id="2054" name="Picture 6" descr="Resultado de imagem para usina solar fotovoltaica cpfl">
+            <a:extLst>
+              <a:ext uri="{FF2B5EF4-FFF2-40B4-BE49-F238E27FC236}">
+                <a16:creationId xmlns:a16="http://schemas.microsoft.com/office/drawing/2014/main" id="{7BA85268-29D4-4B1B-9FFC-22EC3E16350B}"/>
+              </a:ext>
+            </a:extLst>
+          </p:cNvPr>
+          <p:cNvPicPr>
+            <a:picLocks noChangeAspect="1" noChangeArrowheads="1"/>
+          </p:cNvPicPr>
+          <p:nvPr/>
+        </p:nvPicPr>
+        <p:blipFill>
+          <a:blip r:embed="rId4">
+            <a:extLst>
+              <a:ext uri="{28A0092B-C50C-407E-A947-70E740481C1C}">
+                <a14:useLocalDpi xmlns:a14="http://schemas.microsoft.com/office/drawing/2010/main" val="0"/>
+              </a:ext>
+            </a:extLst>
+          </a:blip>
+          <a:srcRect/>
+          <a:stretch>
+            <a:fillRect/>
+          </a:stretch>
+        </p:blipFill>
+        <p:spPr bwMode="auto">
+          <a:xfrm>
+            <a:off x="5306463" y="5075836"/>
+            <a:ext cx="2771775" cy="1647825"/>
+          </a:xfrm>
+          <a:prstGeom prst="ellipse">
+            <a:avLst/>
+          </a:prstGeom>
+          <a:ln>
+            <a:noFill/>
+          </a:ln>
+          <a:effectLst>
+            <a:softEdge rad="112500"/>
+          </a:effectLst>
+          <a:extLst>
+            <a:ext uri="{909E8E84-426E-40DD-AFC4-6F175D3DCCD1}">
+              <a14:hiddenFill xmlns:a14="http://schemas.microsoft.com/office/drawing/2010/main">
+                <a:solidFill>
+                  <a:srgbClr val="FFFFFF"/>
+                </a:solidFill>
+              </a14:hiddenFill>
+            </a:ext>
+          </a:extLst>
+        </p:spPr>
+      </p:pic>
     </p:spTree>
     <p:extLst>
       <p:ext uri="{BB962C8B-B14F-4D97-AF65-F5344CB8AC3E}">
@@ -12531,13 +12986,6 @@
   <p:clrMapOvr>
     <a:masterClrMapping/>
   </p:clrMapOvr>
-  <p:timing>
-    <p:tnLst>
-      <p:par>
-        <p:cTn id="1" dur="indefinite" restart="never" nodeType="tmRoot"/>
-      </p:par>
-    </p:tnLst>
-  </p:timing>
 </p:sld>
 </file>
 
@@ -12591,13 +13039,18 @@
             <p:ph idx="1"/>
           </p:nvPr>
         </p:nvSpPr>
-        <p:spPr/>
+        <p:spPr>
+          <a:xfrm>
+            <a:off x="798512" y="2052917"/>
+            <a:ext cx="8946541" cy="4195481"/>
+          </a:xfrm>
+        </p:spPr>
         <p:txBody>
           <a:bodyPr/>
           <a:lstStyle/>
           <a:p>
             <a:r>
-              <a:rPr lang="pt-BR" dirty="0" smtClean="0"/>
+              <a:rPr lang="pt-BR" dirty="0"/>
               <a:t>Ganho empresa – Certificações:</a:t>
             </a:r>
           </a:p>
@@ -12607,8 +13060,8 @@
               <a:buChar char="q"/>
             </a:pPr>
             <a:r>
-              <a:rPr lang="pt-BR" dirty="0" smtClean="0"/>
-              <a:t>Prêmio Exame/IBRC de Atendimento ao Cliente</a:t>
+              <a:rPr lang="pt-BR" dirty="0"/>
+              <a:t>Lucro anual de R$ 2,2 bilhões;</a:t>
             </a:r>
           </a:p>
           <a:p>
@@ -12617,8 +13070,8 @@
               <a:buChar char="q"/>
             </a:pPr>
             <a:r>
-              <a:rPr lang="pt-BR" dirty="0" smtClean="0"/>
-              <a:t>Prêmios ODS Pacto Global</a:t>
+              <a:rPr lang="pt-BR" dirty="0"/>
+              <a:t>2019 - Prêmio Exame/IBRC de Atendimento ao Cliente;</a:t>
             </a:r>
           </a:p>
           <a:p>
@@ -12627,13 +13080,208 @@
               <a:buChar char="q"/>
             </a:pPr>
             <a:r>
-              <a:rPr lang="pt-BR" dirty="0" smtClean="0"/>
-              <a:t>Prêmio Campeãs da Inovação RGE</a:t>
-            </a:r>
-            <a:endParaRPr lang="pt-BR" dirty="0"/>
-          </a:p>
-        </p:txBody>
-      </p:sp>
+              <a:rPr lang="pt-BR" dirty="0"/>
+              <a:t>2019 - Prêmios ODS Pacto Global;</a:t>
+            </a:r>
+          </a:p>
+          <a:p>
+            <a:pPr lvl="1">
+              <a:buFont typeface="Wingdings" panose="05000000000000000000" pitchFamily="2" charset="2"/>
+              <a:buChar char="q"/>
+            </a:pPr>
+            <a:r>
+              <a:rPr lang="pt-BR" dirty="0"/>
+              <a:t>2019 - Prêmio Campeãs da Inovação RGE;</a:t>
+            </a:r>
+          </a:p>
+          <a:p>
+            <a:pPr lvl="1">
+              <a:buFont typeface="Wingdings" panose="05000000000000000000" pitchFamily="2" charset="2"/>
+              <a:buChar char="q"/>
+            </a:pPr>
+            <a:r>
+              <a:rPr lang="pt-BR" dirty="0"/>
+              <a:t>2018 – Empresas Notáveis;</a:t>
+            </a:r>
+          </a:p>
+          <a:p>
+            <a:pPr lvl="1">
+              <a:buFont typeface="Wingdings" panose="05000000000000000000" pitchFamily="2" charset="2"/>
+              <a:buChar char="q"/>
+            </a:pPr>
+            <a:r>
+              <a:rPr lang="pt-BR" dirty="0"/>
+              <a:t>2018 – América Latina Telecom Awards;</a:t>
+            </a:r>
+          </a:p>
+          <a:p>
+            <a:pPr lvl="1">
+              <a:buFont typeface="Wingdings" panose="05000000000000000000" pitchFamily="2" charset="2"/>
+              <a:buChar char="q"/>
+            </a:pPr>
+            <a:r>
+              <a:rPr lang="pt-BR" dirty="0"/>
+              <a:t>2018 – </a:t>
+            </a:r>
+            <a:r>
+              <a:rPr lang="pt-BR" dirty="0" err="1"/>
+              <a:t>International</a:t>
+            </a:r>
+            <a:r>
+              <a:rPr lang="pt-BR" dirty="0"/>
+              <a:t> General </a:t>
+            </a:r>
+            <a:r>
+              <a:rPr lang="pt-BR" dirty="0" err="1"/>
+              <a:t>Counsel</a:t>
+            </a:r>
+            <a:r>
+              <a:rPr lang="pt-BR" dirty="0"/>
+              <a:t> Awards</a:t>
+            </a:r>
+          </a:p>
+        </p:txBody>
+      </p:sp>
+      <p:pic>
+        <p:nvPicPr>
+          <p:cNvPr id="3074" name="Picture 2" descr="Resultado de imagem para Premiação">
+            <a:extLst>
+              <a:ext uri="{FF2B5EF4-FFF2-40B4-BE49-F238E27FC236}">
+                <a16:creationId xmlns:a16="http://schemas.microsoft.com/office/drawing/2014/main" id="{C7905D3E-0E5D-4F1B-A661-747F29CC9F65}"/>
+              </a:ext>
+            </a:extLst>
+          </p:cNvPr>
+          <p:cNvPicPr>
+            <a:picLocks noChangeAspect="1" noChangeArrowheads="1"/>
+          </p:cNvPicPr>
+          <p:nvPr/>
+        </p:nvPicPr>
+        <p:blipFill>
+          <a:blip r:embed="rId2">
+            <a:extLst>
+              <a:ext uri="{28A0092B-C50C-407E-A947-70E740481C1C}">
+                <a14:useLocalDpi xmlns:a14="http://schemas.microsoft.com/office/drawing/2010/main" val="0"/>
+              </a:ext>
+            </a:extLst>
+          </a:blip>
+          <a:srcRect/>
+          <a:stretch>
+            <a:fillRect/>
+          </a:stretch>
+        </p:blipFill>
+        <p:spPr bwMode="auto">
+          <a:xfrm>
+            <a:off x="8183564" y="1514119"/>
+            <a:ext cx="3362325" cy="1362075"/>
+          </a:xfrm>
+          <a:prstGeom prst="roundRect">
+            <a:avLst>
+              <a:gd name="adj" fmla="val 16667"/>
+            </a:avLst>
+          </a:prstGeom>
+          <a:ln>
+            <a:noFill/>
+          </a:ln>
+          <a:effectLst>
+            <a:outerShdw blurRad="152400" dist="12000" dir="900000" sy="98000" kx="110000" ky="200000" algn="tl" rotWithShape="0">
+              <a:srgbClr val="000000">
+                <a:alpha val="30000"/>
+              </a:srgbClr>
+            </a:outerShdw>
+          </a:effectLst>
+          <a:scene3d>
+            <a:camera prst="perspectiveRelaxed">
+              <a:rot lat="19800000" lon="1200000" rev="20820000"/>
+            </a:camera>
+            <a:lightRig rig="threePt" dir="t"/>
+          </a:scene3d>
+          <a:sp3d contourW="6350" prstMaterial="matte">
+            <a:bevelT w="101600" h="101600"/>
+            <a:contourClr>
+              <a:srgbClr val="969696"/>
+            </a:contourClr>
+          </a:sp3d>
+          <a:extLst>
+            <a:ext uri="{909E8E84-426E-40DD-AFC4-6F175D3DCCD1}">
+              <a14:hiddenFill xmlns:a14="http://schemas.microsoft.com/office/drawing/2010/main">
+                <a:solidFill>
+                  <a:srgbClr val="FFFFFF"/>
+                </a:solidFill>
+              </a14:hiddenFill>
+            </a:ext>
+          </a:extLst>
+        </p:spPr>
+      </p:pic>
+      <p:pic>
+        <p:nvPicPr>
+          <p:cNvPr id="3076" name="Picture 4" descr="Resultado de imagem para Certificações">
+            <a:extLst>
+              <a:ext uri="{FF2B5EF4-FFF2-40B4-BE49-F238E27FC236}">
+                <a16:creationId xmlns:a16="http://schemas.microsoft.com/office/drawing/2014/main" id="{D485E139-2598-4645-A98D-D80DD76A57DD}"/>
+              </a:ext>
+            </a:extLst>
+          </p:cNvPr>
+          <p:cNvPicPr>
+            <a:picLocks noChangeAspect="1" noChangeArrowheads="1"/>
+          </p:cNvPicPr>
+          <p:nvPr/>
+        </p:nvPicPr>
+        <p:blipFill>
+          <a:blip r:embed="rId3">
+            <a:extLst>
+              <a:ext uri="{28A0092B-C50C-407E-A947-70E740481C1C}">
+                <a14:useLocalDpi xmlns:a14="http://schemas.microsoft.com/office/drawing/2010/main" val="0"/>
+              </a:ext>
+            </a:extLst>
+          </a:blip>
+          <a:srcRect/>
+          <a:stretch>
+            <a:fillRect/>
+          </a:stretch>
+        </p:blipFill>
+        <p:spPr bwMode="auto">
+          <a:xfrm rot="544870">
+            <a:off x="8288555" y="4114269"/>
+            <a:ext cx="2390775" cy="1914525"/>
+          </a:xfrm>
+          <a:prstGeom prst="roundRect">
+            <a:avLst>
+              <a:gd name="adj" fmla="val 16667"/>
+            </a:avLst>
+          </a:prstGeom>
+          <a:ln>
+            <a:noFill/>
+          </a:ln>
+          <a:effectLst>
+            <a:outerShdw blurRad="76200" dist="38100" dir="7800000" algn="tl" rotWithShape="0">
+              <a:srgbClr val="000000">
+                <a:alpha val="40000"/>
+              </a:srgbClr>
+            </a:outerShdw>
+          </a:effectLst>
+          <a:scene3d>
+            <a:camera prst="orthographicFront"/>
+            <a:lightRig rig="contrasting" dir="t">
+              <a:rot lat="0" lon="0" rev="4200000"/>
+            </a:lightRig>
+          </a:scene3d>
+          <a:sp3d prstMaterial="plastic">
+            <a:bevelT w="381000" h="114300" prst="relaxedInset"/>
+            <a:contourClr>
+              <a:srgbClr val="969696"/>
+            </a:contourClr>
+          </a:sp3d>
+          <a:extLst>
+            <a:ext uri="{909E8E84-426E-40DD-AFC4-6F175D3DCCD1}">
+              <a14:hiddenFill xmlns:a14="http://schemas.microsoft.com/office/drawing/2010/main">
+                <a:solidFill>
+                  <a:srgbClr val="FFFFFF"/>
+                </a:solidFill>
+              </a14:hiddenFill>
+            </a:ext>
+          </a:extLst>
+        </p:spPr>
+      </p:pic>
     </p:spTree>
     <p:extLst>
       <p:ext uri="{BB962C8B-B14F-4D97-AF65-F5344CB8AC3E}">
@@ -12644,13 +13292,6 @@
   <p:clrMapOvr>
     <a:masterClrMapping/>
   </p:clrMapOvr>
-  <p:timing>
-    <p:tnLst>
-      <p:par>
-        <p:cTn id="1" dur="indefinite" restart="never" nodeType="tmRoot"/>
-      </p:par>
-    </p:tnLst>
-  </p:timing>
 </p:sld>
 </file>
 
@@ -12688,10 +13329,9 @@
           <a:p>
             <a:pPr algn="ctr"/>
             <a:r>
-              <a:rPr lang="pt-BR" dirty="0" smtClean="0"/>
+              <a:rPr lang="pt-BR" dirty="0"/>
               <a:t>WHIRLPOOL</a:t>
             </a:r>
-            <a:endParaRPr lang="pt-BR" dirty="0"/>
           </a:p>
         </p:txBody>
       </p:sp>
@@ -12734,13 +13374,6 @@
   <p:clrMapOvr>
     <a:masterClrMapping/>
   </p:clrMapOvr>
-  <p:timing>
-    <p:tnLst>
-      <p:par>
-        <p:cTn id="1" dur="indefinite" restart="never" nodeType="tmRoot"/>
-      </p:par>
-    </p:tnLst>
-  </p:timing>
 </p:sld>
 </file>
 
@@ -12778,10 +13411,9 @@
           <a:p>
             <a:pPr algn="ctr"/>
             <a:r>
-              <a:rPr lang="pt-BR" dirty="0" smtClean="0"/>
+              <a:rPr lang="pt-BR" dirty="0"/>
               <a:t>Whirlpool - Eletrodomésticos</a:t>
             </a:r>
-            <a:endParaRPr lang="pt-BR" dirty="0"/>
           </a:p>
         </p:txBody>
       </p:sp>
@@ -12801,8 +13433,86 @@
           <a:lstStyle/>
           <a:p>
             <a:r>
-              <a:rPr lang="pt-BR" dirty="0" smtClean="0"/>
-              <a:t>História da Empresa</a:t>
+              <a:rPr lang="pt-BR" dirty="0"/>
+              <a:t>História da Empresa:</a:t>
+            </a:r>
+          </a:p>
+          <a:p>
+            <a:pPr lvl="1">
+              <a:buFont typeface="Wingdings" panose="05000000000000000000" pitchFamily="2" charset="2"/>
+              <a:buChar char="q"/>
+            </a:pPr>
+            <a:r>
+              <a:rPr lang="pt-BR" dirty="0"/>
+              <a:t>Louis e Frederick </a:t>
+            </a:r>
+            <a:r>
+              <a:rPr lang="pt-BR" dirty="0" err="1"/>
+              <a:t>Upton</a:t>
+            </a:r>
+            <a:r>
+              <a:rPr lang="pt-BR" dirty="0"/>
+              <a:t>;</a:t>
+            </a:r>
+          </a:p>
+          <a:p>
+            <a:pPr lvl="1">
+              <a:buFont typeface="Wingdings" panose="05000000000000000000" pitchFamily="2" charset="2"/>
+              <a:buChar char="q"/>
+            </a:pPr>
+            <a:r>
+              <a:rPr lang="pt-BR" dirty="0"/>
+              <a:t>Grande pedidos;</a:t>
+            </a:r>
+          </a:p>
+          <a:p>
+            <a:pPr lvl="1">
+              <a:buFont typeface="Wingdings" panose="05000000000000000000" pitchFamily="2" charset="2"/>
+              <a:buChar char="q"/>
+            </a:pPr>
+            <a:r>
+              <a:rPr lang="pt-BR" dirty="0"/>
+              <a:t>Empecilho e solução com grande empenho;</a:t>
+            </a:r>
+          </a:p>
+          <a:p>
+            <a:pPr lvl="1">
+              <a:buFont typeface="Wingdings" panose="05000000000000000000" pitchFamily="2" charset="2"/>
+              <a:buChar char="q"/>
+            </a:pPr>
+            <a:r>
+              <a:rPr lang="pt-BR" dirty="0"/>
+              <a:t>Sobrevivência da Primeira Guerra Mundial;</a:t>
+            </a:r>
+          </a:p>
+          <a:p>
+            <a:pPr lvl="1">
+              <a:buFont typeface="Wingdings" panose="05000000000000000000" pitchFamily="2" charset="2"/>
+              <a:buChar char="q"/>
+            </a:pPr>
+            <a:r>
+              <a:rPr lang="pt-BR" dirty="0"/>
+              <a:t>Utilização do parque fabril para produção de materiais bélicos;</a:t>
+            </a:r>
+          </a:p>
+          <a:p>
+            <a:pPr lvl="1">
+              <a:buFont typeface="Wingdings" panose="05000000000000000000" pitchFamily="2" charset="2"/>
+              <a:buChar char="q"/>
+            </a:pPr>
+            <a:r>
+              <a:rPr lang="pt-BR" dirty="0"/>
+              <a:t>Troca de nome e 1ª Secadora automática;</a:t>
+            </a:r>
+          </a:p>
+          <a:p>
+            <a:pPr lvl="1">
+              <a:buFont typeface="Wingdings" panose="05000000000000000000" pitchFamily="2" charset="2"/>
+              <a:buChar char="q"/>
+            </a:pPr>
+            <a:r>
+              <a:rPr lang="pt-BR" dirty="0"/>
+              <a:t>Refrigeradores atuais</a:t>
             </a:r>
           </a:p>
         </p:txBody>
@@ -12823,8 +13533,48 @@
           <a:lstStyle/>
           <a:p>
             <a:r>
-              <a:rPr lang="pt-BR" dirty="0" smtClean="0"/>
-              <a:t>Responsabilidade Social</a:t>
+              <a:rPr lang="pt-BR" dirty="0"/>
+              <a:t>Responsabilidade Social:</a:t>
+            </a:r>
+          </a:p>
+          <a:p>
+            <a:pPr lvl="1">
+              <a:buFont typeface="Courier New" panose="02070309020205020404" pitchFamily="49" charset="0"/>
+              <a:buChar char="o"/>
+            </a:pPr>
+            <a:r>
+              <a:rPr lang="pt-BR" dirty="0"/>
+              <a:t>Ambiental</a:t>
+            </a:r>
+          </a:p>
+          <a:p>
+            <a:pPr lvl="2">
+              <a:buFont typeface="Wingdings" panose="05000000000000000000" pitchFamily="2" charset="2"/>
+              <a:buChar char="q"/>
+            </a:pPr>
+            <a:r>
+              <a:rPr lang="pt-BR" dirty="0"/>
+              <a:t>Menor emissão de substancias nocivas;</a:t>
+            </a:r>
+          </a:p>
+          <a:p>
+            <a:pPr lvl="2">
+              <a:buFont typeface="Wingdings" panose="05000000000000000000" pitchFamily="2" charset="2"/>
+              <a:buChar char="q"/>
+            </a:pPr>
+            <a:r>
+              <a:rPr lang="pt-BR" dirty="0"/>
+              <a:t>Produtos com baixo consumo energético;</a:t>
+            </a:r>
+          </a:p>
+          <a:p>
+            <a:pPr lvl="2">
+              <a:buFont typeface="Wingdings" panose="05000000000000000000" pitchFamily="2" charset="2"/>
+              <a:buChar char="q"/>
+            </a:pPr>
+            <a:r>
+              <a:rPr lang="pt-BR" dirty="0"/>
+              <a:t>Redução de energia gasta em comparação ao ano antecessor</a:t>
             </a:r>
           </a:p>
         </p:txBody>
@@ -12839,13 +13589,6 @@
   <p:clrMapOvr>
     <a:masterClrMapping/>
   </p:clrMapOvr>
-  <p:timing>
-    <p:tnLst>
-      <p:par>
-        <p:cTn id="1" dur="indefinite" restart="never" nodeType="tmRoot"/>
-      </p:par>
-    </p:tnLst>
-  </p:timing>
 </p:sld>
 </file>
 
@@ -12905,31 +13648,52 @@
           <a:lstStyle/>
           <a:p>
             <a:r>
-              <a:rPr lang="pt-BR" dirty="0" smtClean="0"/>
+              <a:rPr lang="pt-BR" dirty="0"/>
               <a:t>Onde é aplicada?</a:t>
             </a:r>
           </a:p>
           <a:p>
+            <a:pPr lvl="1">
+              <a:buFont typeface="Wingdings" panose="05000000000000000000" pitchFamily="2" charset="2"/>
+              <a:buChar char="q"/>
+            </a:pPr>
+            <a:r>
+              <a:rPr lang="pt-BR" dirty="0"/>
+              <a:t>Produção de eletrodomésticos</a:t>
+            </a:r>
+          </a:p>
+          <a:p>
+            <a:pPr marL="0" indent="0">
+              <a:buNone/>
+            </a:pPr>
             <a:endParaRPr lang="pt-BR" dirty="0"/>
           </a:p>
           <a:p>
-            <a:endParaRPr lang="pt-BR" dirty="0" smtClean="0"/>
-          </a:p>
-          <a:p>
-            <a:endParaRPr lang="pt-BR" dirty="0"/>
-          </a:p>
-          <a:p>
-            <a:endParaRPr lang="pt-BR" dirty="0" smtClean="0"/>
-          </a:p>
-          <a:p>
-            <a:endParaRPr lang="pt-BR" dirty="0" smtClean="0"/>
-          </a:p>
-          <a:p>
-            <a:r>
-              <a:rPr lang="pt-BR" dirty="0" smtClean="0"/>
+            <a:r>
+              <a:rPr lang="pt-BR" dirty="0"/>
               <a:t>Como aplicada?</a:t>
             </a:r>
           </a:p>
+          <a:p>
+            <a:pPr lvl="1">
+              <a:buFont typeface="Wingdings" panose="05000000000000000000" pitchFamily="2" charset="2"/>
+              <a:buChar char="q"/>
+            </a:pPr>
+            <a:r>
+              <a:rPr lang="pt-BR" dirty="0"/>
+              <a:t>Limpeza das chapas metálicas de maneiras alternativas;</a:t>
+            </a:r>
+          </a:p>
+          <a:p>
+            <a:pPr lvl="1">
+              <a:buFont typeface="Wingdings" panose="05000000000000000000" pitchFamily="2" charset="2"/>
+              <a:buChar char="q"/>
+            </a:pPr>
+            <a:r>
+              <a:rPr lang="pt-BR" dirty="0"/>
+              <a:t>Redução da emissão de substancias nocivas;</a:t>
+            </a:r>
+          </a:p>
         </p:txBody>
       </p:sp>
       <p:sp>
@@ -12948,8 +13712,32 @@
           <a:lstStyle/>
           <a:p>
             <a:r>
-              <a:rPr lang="pt-BR" dirty="0" smtClean="0"/>
+              <a:rPr lang="pt-BR" dirty="0"/>
               <a:t>Pra quem?</a:t>
+            </a:r>
+          </a:p>
+          <a:p>
+            <a:pPr lvl="1">
+              <a:buFont typeface="Wingdings" panose="05000000000000000000" pitchFamily="2" charset="2"/>
+              <a:buChar char="q"/>
+            </a:pPr>
+            <a:r>
+              <a:rPr lang="pt-BR" dirty="0"/>
+              <a:t>Ela abrange o mundo inteiro;</a:t>
+            </a:r>
+          </a:p>
+          <a:p>
+            <a:pPr lvl="1">
+              <a:buFont typeface="Wingdings" panose="05000000000000000000" pitchFamily="2" charset="2"/>
+              <a:buChar char="q"/>
+            </a:pPr>
+            <a:r>
+              <a:rPr lang="pt-BR" dirty="0" err="1"/>
+              <a:t>Domiciíios</a:t>
+            </a:r>
+            <a:r>
+              <a:rPr lang="pt-BR" dirty="0"/>
+              <a:t> e restaurantes </a:t>
             </a:r>
           </a:p>
         </p:txBody>
@@ -12964,13 +13752,6 @@
   <p:clrMapOvr>
     <a:masterClrMapping/>
   </p:clrMapOvr>
-  <p:timing>
-    <p:tnLst>
-      <p:par>
-        <p:cTn id="1" dur="indefinite" restart="never" nodeType="tmRoot"/>
-      </p:par>
-    </p:tnLst>
-  </p:timing>
 </p:sld>
 </file>
 
@@ -13030,13 +13811,225 @@
           <a:lstStyle/>
           <a:p>
             <a:r>
-              <a:rPr lang="pt-BR" dirty="0" smtClean="0"/>
+              <a:rPr lang="pt-BR" dirty="0"/>
               <a:t>Ganho empresa – Certificações:</a:t>
             </a:r>
+          </a:p>
+          <a:p>
+            <a:pPr lvl="1">
+              <a:buFont typeface="Wingdings" panose="05000000000000000000" pitchFamily="2" charset="2"/>
+              <a:buChar char="q"/>
+            </a:pPr>
+            <a:r>
+              <a:rPr lang="pt-BR" dirty="0"/>
+              <a:t>2018 - Prêmio MECP;</a:t>
+            </a:r>
+          </a:p>
+          <a:p>
+            <a:pPr lvl="1">
+              <a:buFont typeface="Wingdings" panose="05000000000000000000" pitchFamily="2" charset="2"/>
+              <a:buChar char="q"/>
+            </a:pPr>
+            <a:r>
+              <a:rPr lang="pt-BR" dirty="0"/>
+              <a:t>2018 - Prêmio Empresas que mais respeitam o consumidor;</a:t>
+            </a:r>
+          </a:p>
+          <a:p>
+            <a:pPr lvl="1">
+              <a:buFont typeface="Wingdings" panose="05000000000000000000" pitchFamily="2" charset="2"/>
+              <a:buChar char="q"/>
+            </a:pPr>
+            <a:r>
+              <a:rPr lang="pt-BR" dirty="0"/>
+              <a:t>2018 – Prêmio Top </a:t>
+            </a:r>
+            <a:r>
+              <a:rPr lang="pt-BR" dirty="0" err="1"/>
+              <a:t>of</a:t>
+            </a:r>
+            <a:r>
+              <a:rPr lang="pt-BR" dirty="0"/>
+              <a:t> Mind Casa e Mercado;</a:t>
+            </a:r>
+          </a:p>
+          <a:p>
+            <a:pPr lvl="1">
+              <a:buFont typeface="Wingdings" panose="05000000000000000000" pitchFamily="2" charset="2"/>
+              <a:buChar char="q"/>
+            </a:pPr>
+            <a:r>
+              <a:rPr lang="pt-BR" dirty="0"/>
+              <a:t>2018 – Prêmio Melhores Serviços – Estadão;</a:t>
+            </a:r>
+          </a:p>
+          <a:p>
+            <a:pPr lvl="1">
+              <a:buFont typeface="Wingdings" panose="05000000000000000000" pitchFamily="2" charset="2"/>
+              <a:buChar char="q"/>
+            </a:pPr>
+            <a:r>
+              <a:rPr lang="pt-BR" dirty="0"/>
+              <a:t>2017 – Prêmio Profissional do Setor de Relacionamento com Clientes;</a:t>
+            </a:r>
+          </a:p>
+          <a:p>
+            <a:pPr lvl="1">
+              <a:buFont typeface="Wingdings" panose="05000000000000000000" pitchFamily="2" charset="2"/>
+              <a:buChar char="q"/>
+            </a:pPr>
+            <a:r>
+              <a:rPr lang="pt-BR" dirty="0"/>
+              <a:t>2017 – Prêmio </a:t>
+            </a:r>
+            <a:r>
+              <a:rPr lang="pt-BR" dirty="0" err="1"/>
+              <a:t>Conarec</a:t>
+            </a:r>
             <a:endParaRPr lang="pt-BR" dirty="0"/>
           </a:p>
         </p:txBody>
       </p:sp>
+      <p:pic>
+        <p:nvPicPr>
+          <p:cNvPr id="4098" name="Picture 2" descr="Resultado de imagem para certificações">
+            <a:extLst>
+              <a:ext uri="{FF2B5EF4-FFF2-40B4-BE49-F238E27FC236}">
+                <a16:creationId xmlns:a16="http://schemas.microsoft.com/office/drawing/2014/main" id="{8287B2BA-293C-4016-A1B1-1A0830248038}"/>
+              </a:ext>
+            </a:extLst>
+          </p:cNvPr>
+          <p:cNvPicPr>
+            <a:picLocks noChangeAspect="1" noChangeArrowheads="1"/>
+          </p:cNvPicPr>
+          <p:nvPr/>
+        </p:nvPicPr>
+        <p:blipFill>
+          <a:blip r:embed="rId2">
+            <a:extLst>
+              <a:ext uri="{28A0092B-C50C-407E-A947-70E740481C1C}">
+                <a14:useLocalDpi xmlns:a14="http://schemas.microsoft.com/office/drawing/2010/main" val="0"/>
+              </a:ext>
+            </a:extLst>
+          </a:blip>
+          <a:srcRect/>
+          <a:stretch>
+            <a:fillRect/>
+          </a:stretch>
+        </p:blipFill>
+        <p:spPr bwMode="auto">
+          <a:xfrm rot="592259">
+            <a:off x="6164675" y="4716487"/>
+            <a:ext cx="2390775" cy="1914525"/>
+          </a:xfrm>
+          <a:prstGeom prst="roundRect">
+            <a:avLst>
+              <a:gd name="adj" fmla="val 16667"/>
+            </a:avLst>
+          </a:prstGeom>
+          <a:ln>
+            <a:noFill/>
+          </a:ln>
+          <a:effectLst>
+            <a:outerShdw blurRad="76200" dist="38100" dir="7800000" algn="tl" rotWithShape="0">
+              <a:srgbClr val="000000">
+                <a:alpha val="40000"/>
+              </a:srgbClr>
+            </a:outerShdw>
+          </a:effectLst>
+          <a:scene3d>
+            <a:camera prst="orthographicFront"/>
+            <a:lightRig rig="contrasting" dir="t">
+              <a:rot lat="0" lon="0" rev="4200000"/>
+            </a:lightRig>
+          </a:scene3d>
+          <a:sp3d prstMaterial="plastic">
+            <a:bevelT w="381000" h="114300" prst="relaxedInset"/>
+            <a:contourClr>
+              <a:srgbClr val="969696"/>
+            </a:contourClr>
+          </a:sp3d>
+          <a:extLst>
+            <a:ext uri="{909E8E84-426E-40DD-AFC4-6F175D3DCCD1}">
+              <a14:hiddenFill xmlns:a14="http://schemas.microsoft.com/office/drawing/2010/main">
+                <a:solidFill>
+                  <a:srgbClr val="FFFFFF"/>
+                </a:solidFill>
+              </a14:hiddenFill>
+            </a:ext>
+          </a:extLst>
+        </p:spPr>
+      </p:pic>
+      <p:pic>
+        <p:nvPicPr>
+          <p:cNvPr id="4100" name="Picture 4" descr="Resultado de imagem para premiacao">
+            <a:extLst>
+              <a:ext uri="{FF2B5EF4-FFF2-40B4-BE49-F238E27FC236}">
+                <a16:creationId xmlns:a16="http://schemas.microsoft.com/office/drawing/2014/main" id="{8FDB3351-7163-43A9-9475-11E0B97497BA}"/>
+              </a:ext>
+            </a:extLst>
+          </p:cNvPr>
+          <p:cNvPicPr>
+            <a:picLocks noChangeAspect="1" noChangeArrowheads="1"/>
+          </p:cNvPicPr>
+          <p:nvPr/>
+        </p:nvPicPr>
+        <p:blipFill>
+          <a:blip r:embed="rId3">
+            <a:extLst>
+              <a:ext uri="{28A0092B-C50C-407E-A947-70E740481C1C}">
+                <a14:useLocalDpi xmlns:a14="http://schemas.microsoft.com/office/drawing/2010/main" val="0"/>
+              </a:ext>
+            </a:extLst>
+          </a:blip>
+          <a:srcRect/>
+          <a:stretch>
+            <a:fillRect/>
+          </a:stretch>
+        </p:blipFill>
+        <p:spPr bwMode="auto">
+          <a:xfrm rot="20955278">
+            <a:off x="8828089" y="1926978"/>
+            <a:ext cx="2819400" cy="1619250"/>
+          </a:xfrm>
+          <a:prstGeom prst="roundRect">
+            <a:avLst>
+              <a:gd name="adj" fmla="val 16667"/>
+            </a:avLst>
+          </a:prstGeom>
+          <a:ln>
+            <a:noFill/>
+          </a:ln>
+          <a:effectLst>
+            <a:outerShdw blurRad="76200" dist="38100" dir="7800000" algn="tl" rotWithShape="0">
+              <a:srgbClr val="000000">
+                <a:alpha val="40000"/>
+              </a:srgbClr>
+            </a:outerShdw>
+          </a:effectLst>
+          <a:scene3d>
+            <a:camera prst="orthographicFront"/>
+            <a:lightRig rig="contrasting" dir="t">
+              <a:rot lat="0" lon="0" rev="4200000"/>
+            </a:lightRig>
+          </a:scene3d>
+          <a:sp3d prstMaterial="plastic">
+            <a:bevelT w="381000" h="114300" prst="relaxedInset"/>
+            <a:contourClr>
+              <a:srgbClr val="969696"/>
+            </a:contourClr>
+          </a:sp3d>
+          <a:extLst>
+            <a:ext uri="{909E8E84-426E-40DD-AFC4-6F175D3DCCD1}">
+              <a14:hiddenFill xmlns:a14="http://schemas.microsoft.com/office/drawing/2010/main">
+                <a:solidFill>
+                  <a:srgbClr val="FFFFFF"/>
+                </a:solidFill>
+              </a14:hiddenFill>
+            </a:ext>
+          </a:extLst>
+        </p:spPr>
+      </p:pic>
     </p:spTree>
     <p:extLst>
       <p:ext uri="{BB962C8B-B14F-4D97-AF65-F5344CB8AC3E}">
@@ -13047,13 +14040,6 @@
   <p:clrMapOvr>
     <a:masterClrMapping/>
   </p:clrMapOvr>
-  <p:timing>
-    <p:tnLst>
-      <p:par>
-        <p:cTn id="1" dur="indefinite" restart="never" nodeType="tmRoot"/>
-      </p:par>
-    </p:tnLst>
-  </p:timing>
 </p:sld>
 </file>
 

</xml_diff>